<commit_message>
mod depois da entrega
</commit_message>
<xml_diff>
--- a/MLP20182/relatorio/Slides MLP - Rodrigo Pumar e Bruno Pedrazza.pptx
+++ b/MLP20182/relatorio/Slides MLP - Rodrigo Pumar e Bruno Pedrazza.pptx
@@ -13,9 +13,10 @@
     <p:sldId id="262" r:id="rId7"/>
     <p:sldId id="261" r:id="rId8"/>
     <p:sldId id="263" r:id="rId9"/>
-    <p:sldId id="264" r:id="rId10"/>
-    <p:sldId id="265" r:id="rId11"/>
-    <p:sldId id="266" r:id="rId12"/>
+    <p:sldId id="267" r:id="rId10"/>
+    <p:sldId id="264" r:id="rId11"/>
+    <p:sldId id="265" r:id="rId12"/>
+    <p:sldId id="266" r:id="rId13"/>
   </p:sldIdLst>
   <p:sldSz cx="12192000" cy="6858000"/>
   <p:notesSz cx="6858000" cy="9144000"/>
@@ -125,7 +126,7 @@
 <file path=ppt/revisionInfo.xml><?xml version="1.0" encoding="utf-8"?>
 <p1510:revInfo xmlns:a="http://schemas.openxmlformats.org/drawingml/2006/main" xmlns:r="http://schemas.openxmlformats.org/officeDocument/2006/relationships" xmlns:p1510="http://schemas.microsoft.com/office/powerpoint/2015/10/main">
   <p1510:revLst>
-    <p1510:client id="{1B23252A-24D5-456D-B93C-CB62C2106A97}" v="423" dt="2018-09-24T02:53:24.447"/>
+    <p1510:client id="{1B23252A-24D5-456D-B93C-CB62C2106A97}" v="443" dt="2018-09-24T16:06:25.181"/>
   </p1510:revLst>
 </p1510:revInfo>
 </file>
@@ -135,7 +136,7 @@
   <pc:docChgLst>
     <pc:chgData name="Rodrigo Pumar" userId="05c6da525856e9fb" providerId="LiveId" clId="{1B23252A-24D5-456D-B93C-CB62C2106A97}"/>
     <pc:docChg chg="undo custSel addSld modSld">
-      <pc:chgData name="Rodrigo Pumar" userId="05c6da525856e9fb" providerId="LiveId" clId="{1B23252A-24D5-456D-B93C-CB62C2106A97}" dt="2018-09-24T02:53:24.447" v="417" actId="20577"/>
+      <pc:chgData name="Rodrigo Pumar" userId="05c6da525856e9fb" providerId="LiveId" clId="{1B23252A-24D5-456D-B93C-CB62C2106A97}" dt="2018-09-24T16:06:25.181" v="437" actId="20577"/>
       <pc:docMkLst>
         <pc:docMk/>
       </pc:docMkLst>
@@ -488,6 +489,45 @@
           </ac:spMkLst>
         </pc:spChg>
       </pc:sldChg>
+      <pc:sldChg chg="addSp delSp modSp add">
+        <pc:chgData name="Rodrigo Pumar" userId="05c6da525856e9fb" providerId="LiveId" clId="{1B23252A-24D5-456D-B93C-CB62C2106A97}" dt="2018-09-24T16:06:25.181" v="437" actId="20577"/>
+        <pc:sldMkLst>
+          <pc:docMk/>
+          <pc:sldMk cId="1874959623" sldId="267"/>
+        </pc:sldMkLst>
+        <pc:spChg chg="mod">
+          <ac:chgData name="Rodrigo Pumar" userId="05c6da525856e9fb" providerId="LiveId" clId="{1B23252A-24D5-456D-B93C-CB62C2106A97}" dt="2018-09-24T16:06:25.181" v="437" actId="20577"/>
+          <ac:spMkLst>
+            <pc:docMk/>
+            <pc:sldMk cId="1874959623" sldId="267"/>
+            <ac:spMk id="2" creationId="{FF5A4DB1-33AE-4011-B0E9-463D3BCC4B6C}"/>
+          </ac:spMkLst>
+        </pc:spChg>
+        <pc:spChg chg="del">
+          <ac:chgData name="Rodrigo Pumar" userId="05c6da525856e9fb" providerId="LiveId" clId="{1B23252A-24D5-456D-B93C-CB62C2106A97}" dt="2018-09-24T16:05:52.032" v="419" actId="478"/>
+          <ac:spMkLst>
+            <pc:docMk/>
+            <pc:sldMk cId="1874959623" sldId="267"/>
+            <ac:spMk id="3" creationId="{C6F617BA-4FF5-44F9-993D-4CD585C84695}"/>
+          </ac:spMkLst>
+        </pc:spChg>
+        <pc:spChg chg="add mod">
+          <ac:chgData name="Rodrigo Pumar" userId="05c6da525856e9fb" providerId="LiveId" clId="{1B23252A-24D5-456D-B93C-CB62C2106A97}" dt="2018-09-24T16:06:14.473" v="423"/>
+          <ac:spMkLst>
+            <pc:docMk/>
+            <pc:sldMk cId="1874959623" sldId="267"/>
+            <ac:spMk id="6" creationId="{00DAFA02-4916-4E3F-B49A-A78D684A57DD}"/>
+          </ac:spMkLst>
+        </pc:spChg>
+        <pc:picChg chg="del">
+          <ac:chgData name="Rodrigo Pumar" userId="05c6da525856e9fb" providerId="LiveId" clId="{1B23252A-24D5-456D-B93C-CB62C2106A97}" dt="2018-09-24T16:05:53.386" v="420" actId="478"/>
+          <ac:picMkLst>
+            <pc:docMk/>
+            <pc:sldMk cId="1874959623" sldId="267"/>
+            <ac:picMk id="5" creationId="{7C1A3641-EA3D-4680-BFEE-E6548520B858}"/>
+          </ac:picMkLst>
+        </pc:picChg>
+      </pc:sldChg>
     </pc:docChg>
   </pc:docChgLst>
 </pc:chgInfo>
@@ -642,7 +682,7 @@
           <a:p>
             <a:fld id="{5ACB6347-7B7F-458E-88A4-0BB1D6B5031F}" type="datetimeFigureOut">
               <a:rPr lang="pt-BR" smtClean="0"/>
-              <a:t>23/09/2018</a:t>
+              <a:t>24/09/2018</a:t>
             </a:fld>
             <a:endParaRPr lang="pt-BR"/>
           </a:p>
@@ -842,7 +882,7 @@
           <a:p>
             <a:fld id="{5ACB6347-7B7F-458E-88A4-0BB1D6B5031F}" type="datetimeFigureOut">
               <a:rPr lang="pt-BR" smtClean="0"/>
-              <a:t>23/09/2018</a:t>
+              <a:t>24/09/2018</a:t>
             </a:fld>
             <a:endParaRPr lang="pt-BR"/>
           </a:p>
@@ -1052,7 +1092,7 @@
           <a:p>
             <a:fld id="{5ACB6347-7B7F-458E-88A4-0BB1D6B5031F}" type="datetimeFigureOut">
               <a:rPr lang="pt-BR" smtClean="0"/>
-              <a:t>23/09/2018</a:t>
+              <a:t>24/09/2018</a:t>
             </a:fld>
             <a:endParaRPr lang="pt-BR"/>
           </a:p>
@@ -1252,7 +1292,7 @@
           <a:p>
             <a:fld id="{5ACB6347-7B7F-458E-88A4-0BB1D6B5031F}" type="datetimeFigureOut">
               <a:rPr lang="pt-BR" smtClean="0"/>
-              <a:t>23/09/2018</a:t>
+              <a:t>24/09/2018</a:t>
             </a:fld>
             <a:endParaRPr lang="pt-BR"/>
           </a:p>
@@ -1528,7 +1568,7 @@
           <a:p>
             <a:fld id="{5ACB6347-7B7F-458E-88A4-0BB1D6B5031F}" type="datetimeFigureOut">
               <a:rPr lang="pt-BR" smtClean="0"/>
-              <a:t>23/09/2018</a:t>
+              <a:t>24/09/2018</a:t>
             </a:fld>
             <a:endParaRPr lang="pt-BR"/>
           </a:p>
@@ -1796,7 +1836,7 @@
           <a:p>
             <a:fld id="{5ACB6347-7B7F-458E-88A4-0BB1D6B5031F}" type="datetimeFigureOut">
               <a:rPr lang="pt-BR" smtClean="0"/>
-              <a:t>23/09/2018</a:t>
+              <a:t>24/09/2018</a:t>
             </a:fld>
             <a:endParaRPr lang="pt-BR"/>
           </a:p>
@@ -2211,7 +2251,7 @@
           <a:p>
             <a:fld id="{5ACB6347-7B7F-458E-88A4-0BB1D6B5031F}" type="datetimeFigureOut">
               <a:rPr lang="pt-BR" smtClean="0"/>
-              <a:t>23/09/2018</a:t>
+              <a:t>24/09/2018</a:t>
             </a:fld>
             <a:endParaRPr lang="pt-BR"/>
           </a:p>
@@ -2353,7 +2393,7 @@
           <a:p>
             <a:fld id="{5ACB6347-7B7F-458E-88A4-0BB1D6B5031F}" type="datetimeFigureOut">
               <a:rPr lang="pt-BR" smtClean="0"/>
-              <a:t>23/09/2018</a:t>
+              <a:t>24/09/2018</a:t>
             </a:fld>
             <a:endParaRPr lang="pt-BR"/>
           </a:p>
@@ -2466,7 +2506,7 @@
           <a:p>
             <a:fld id="{5ACB6347-7B7F-458E-88A4-0BB1D6B5031F}" type="datetimeFigureOut">
               <a:rPr lang="pt-BR" smtClean="0"/>
-              <a:t>23/09/2018</a:t>
+              <a:t>24/09/2018</a:t>
             </a:fld>
             <a:endParaRPr lang="pt-BR"/>
           </a:p>
@@ -2779,7 +2819,7 @@
           <a:p>
             <a:fld id="{5ACB6347-7B7F-458E-88A4-0BB1D6B5031F}" type="datetimeFigureOut">
               <a:rPr lang="pt-BR" smtClean="0"/>
-              <a:t>23/09/2018</a:t>
+              <a:t>24/09/2018</a:t>
             </a:fld>
             <a:endParaRPr lang="pt-BR"/>
           </a:p>
@@ -3068,7 +3108,7 @@
           <a:p>
             <a:fld id="{5ACB6347-7B7F-458E-88A4-0BB1D6B5031F}" type="datetimeFigureOut">
               <a:rPr lang="pt-BR" smtClean="0"/>
-              <a:t>23/09/2018</a:t>
+              <a:t>24/09/2018</a:t>
             </a:fld>
             <a:endParaRPr lang="pt-BR"/>
           </a:p>
@@ -3311,7 +3351,7 @@
           <a:p>
             <a:fld id="{5ACB6347-7B7F-458E-88A4-0BB1D6B5031F}" type="datetimeFigureOut">
               <a:rPr lang="pt-BR" smtClean="0"/>
-              <a:t>23/09/2018</a:t>
+              <a:t>24/09/2018</a:t>
             </a:fld>
             <a:endParaRPr lang="pt-BR"/>
           </a:p>
@@ -3872,1086 +3912,6 @@
           <p:cNvPr id="2" name="Title 1">
             <a:extLst>
               <a:ext uri="{FF2B5EF4-FFF2-40B4-BE49-F238E27FC236}">
-                <a16:creationId xmlns:a16="http://schemas.microsoft.com/office/drawing/2014/main" id="{E101AA06-EB15-459D-BDB1-46F7AC4EC704}"/>
-              </a:ext>
-            </a:extLst>
-          </p:cNvPr>
-          <p:cNvSpPr>
-            <a:spLocks noGrp="1"/>
-          </p:cNvSpPr>
-          <p:nvPr>
-            <p:ph type="title"/>
-          </p:nvPr>
-        </p:nvSpPr>
-        <p:spPr/>
-        <p:txBody>
-          <a:bodyPr/>
-          <a:lstStyle/>
-          <a:p>
-            <a:r>
-              <a:rPr lang="en-US" dirty="0" err="1"/>
-              <a:t>Resultados</a:t>
-            </a:r>
-            <a:endParaRPr lang="pt-BR" dirty="0"/>
-          </a:p>
-        </p:txBody>
-      </p:sp>
-      <p:sp>
-        <p:nvSpPr>
-          <p:cNvPr id="3" name="Content Placeholder 2">
-            <a:extLst>
-              <a:ext uri="{FF2B5EF4-FFF2-40B4-BE49-F238E27FC236}">
-                <a16:creationId xmlns:a16="http://schemas.microsoft.com/office/drawing/2014/main" id="{1074435D-1642-4487-A46D-CD7DBDC98956}"/>
-              </a:ext>
-            </a:extLst>
-          </p:cNvPr>
-          <p:cNvSpPr>
-            <a:spLocks noGrp="1"/>
-          </p:cNvSpPr>
-          <p:nvPr>
-            <p:ph idx="1"/>
-          </p:nvPr>
-        </p:nvSpPr>
-        <p:spPr/>
-        <p:txBody>
-          <a:bodyPr/>
-          <a:lstStyle/>
-          <a:p>
-            <a:r>
-              <a:rPr lang="pt-BR" dirty="0"/>
-              <a:t>O nosso algoritmo genético teve melhoras significativas contra o guloso, porem mesmo com o aumento do número de gerações, não conseguimos nos mover mais perto do próximo do BKS/OPT que justificasse o aumento do tempo de execução. Não sabemos se o algoritmo funciona perfeitamente para sair de máximos locais, visto não fizemos estatística da geração de filhos.</a:t>
-            </a:r>
-          </a:p>
-          <a:p>
-            <a:endParaRPr lang="pt-BR" dirty="0"/>
-          </a:p>
-        </p:txBody>
-      </p:sp>
-    </p:spTree>
-    <p:extLst>
-      <p:ext uri="{BB962C8B-B14F-4D97-AF65-F5344CB8AC3E}">
-        <p14:creationId xmlns:p14="http://schemas.microsoft.com/office/powerpoint/2010/main" val="593808388"/>
-      </p:ext>
-    </p:extLst>
-  </p:cSld>
-  <p:clrMapOvr>
-    <a:masterClrMapping/>
-  </p:clrMapOvr>
-</p:sld>
-</file>
-
-<file path=ppt/slides/slide11.xml><?xml version="1.0" encoding="utf-8"?>
-<p:sld xmlns:a="http://schemas.openxmlformats.org/drawingml/2006/main" xmlns:r="http://schemas.openxmlformats.org/officeDocument/2006/relationships" xmlns:p="http://schemas.openxmlformats.org/presentationml/2006/main">
-  <p:cSld>
-    <p:spTree>
-      <p:nvGrpSpPr>
-        <p:cNvPr id="1" name=""/>
-        <p:cNvGrpSpPr/>
-        <p:nvPr/>
-      </p:nvGrpSpPr>
-      <p:grpSpPr>
-        <a:xfrm>
-          <a:off x="0" y="0"/>
-          <a:ext cx="0" cy="0"/>
-          <a:chOff x="0" y="0"/>
-          <a:chExt cx="0" cy="0"/>
-        </a:xfrm>
-      </p:grpSpPr>
-      <p:sp>
-        <p:nvSpPr>
-          <p:cNvPr id="2" name="Title 1">
-            <a:extLst>
-              <a:ext uri="{FF2B5EF4-FFF2-40B4-BE49-F238E27FC236}">
-                <a16:creationId xmlns:a16="http://schemas.microsoft.com/office/drawing/2014/main" id="{E101AA06-EB15-459D-BDB1-46F7AC4EC704}"/>
-              </a:ext>
-            </a:extLst>
-          </p:cNvPr>
-          <p:cNvSpPr>
-            <a:spLocks noGrp="1"/>
-          </p:cNvSpPr>
-          <p:nvPr>
-            <p:ph type="title"/>
-          </p:nvPr>
-        </p:nvSpPr>
-        <p:spPr/>
-        <p:txBody>
-          <a:bodyPr/>
-          <a:lstStyle/>
-          <a:p>
-            <a:r>
-              <a:rPr lang="en-US" dirty="0" err="1"/>
-              <a:t>Conclus</a:t>
-            </a:r>
-            <a:r>
-              <a:rPr lang="pt-BR" dirty="0" err="1"/>
-              <a:t>ão</a:t>
-            </a:r>
-            <a:endParaRPr lang="pt-BR" dirty="0"/>
-          </a:p>
-        </p:txBody>
-      </p:sp>
-      <p:sp>
-        <p:nvSpPr>
-          <p:cNvPr id="3" name="Content Placeholder 2">
-            <a:extLst>
-              <a:ext uri="{FF2B5EF4-FFF2-40B4-BE49-F238E27FC236}">
-                <a16:creationId xmlns:a16="http://schemas.microsoft.com/office/drawing/2014/main" id="{1074435D-1642-4487-A46D-CD7DBDC98956}"/>
-              </a:ext>
-            </a:extLst>
-          </p:cNvPr>
-          <p:cNvSpPr>
-            <a:spLocks noGrp="1"/>
-          </p:cNvSpPr>
-          <p:nvPr>
-            <p:ph idx="1"/>
-          </p:nvPr>
-        </p:nvSpPr>
-        <p:spPr/>
-        <p:txBody>
-          <a:bodyPr/>
-          <a:lstStyle/>
-          <a:p>
-            <a:r>
-              <a:rPr lang="pt-BR" dirty="0"/>
-              <a:t>A implementação do algoritmo genético foi bastante iterativa, usando conceitos aprendidos em aula. A implementação deu bastante margem para criatividade e iteração numérica nos valores para maximizar a eficiência do resultado.</a:t>
-            </a:r>
-          </a:p>
-          <a:p>
-            <a:r>
-              <a:rPr lang="pt-BR" dirty="0"/>
-              <a:t>Em problemas reais em que não se sabe qual o melhor possível, acreditamos que essa analise da performance e </a:t>
-            </a:r>
-            <a:r>
-              <a:rPr lang="pt-BR" dirty="0" err="1"/>
-              <a:t>corretude</a:t>
-            </a:r>
-            <a:r>
-              <a:rPr lang="pt-BR" dirty="0"/>
-              <a:t> do algoritmo se tornam bem mais complicados, pois ajudou muito saber qual o máximo ótimo, como parâmetro para guiar e ajustar o código e os parâmetros.</a:t>
-            </a:r>
-          </a:p>
-          <a:p>
-            <a:endParaRPr lang="pt-BR" dirty="0"/>
-          </a:p>
-        </p:txBody>
-      </p:sp>
-    </p:spTree>
-    <p:extLst>
-      <p:ext uri="{BB962C8B-B14F-4D97-AF65-F5344CB8AC3E}">
-        <p14:creationId xmlns:p14="http://schemas.microsoft.com/office/powerpoint/2010/main" val="2419190334"/>
-      </p:ext>
-    </p:extLst>
-  </p:cSld>
-  <p:clrMapOvr>
-    <a:masterClrMapping/>
-  </p:clrMapOvr>
-</p:sld>
-</file>
-
-<file path=ppt/slides/slide2.xml><?xml version="1.0" encoding="utf-8"?>
-<p:sld xmlns:a="http://schemas.openxmlformats.org/drawingml/2006/main" xmlns:r="http://schemas.openxmlformats.org/officeDocument/2006/relationships" xmlns:p="http://schemas.openxmlformats.org/presentationml/2006/main">
-  <p:cSld>
-    <p:spTree>
-      <p:nvGrpSpPr>
-        <p:cNvPr id="1" name=""/>
-        <p:cNvGrpSpPr/>
-        <p:nvPr/>
-      </p:nvGrpSpPr>
-      <p:grpSpPr>
-        <a:xfrm>
-          <a:off x="0" y="0"/>
-          <a:ext cx="0" cy="0"/>
-          <a:chOff x="0" y="0"/>
-          <a:chExt cx="0" cy="0"/>
-        </a:xfrm>
-      </p:grpSpPr>
-      <p:sp>
-        <p:nvSpPr>
-          <p:cNvPr id="2" name="Title 1">
-            <a:extLst>
-              <a:ext uri="{FF2B5EF4-FFF2-40B4-BE49-F238E27FC236}">
-                <a16:creationId xmlns:a16="http://schemas.microsoft.com/office/drawing/2014/main" id="{A0FC46FC-D0FC-4B5F-8330-42A0C2D4899C}"/>
-              </a:ext>
-            </a:extLst>
-          </p:cNvPr>
-          <p:cNvSpPr>
-            <a:spLocks noGrp="1"/>
-          </p:cNvSpPr>
-          <p:nvPr>
-            <p:ph type="title"/>
-          </p:nvPr>
-        </p:nvSpPr>
-        <p:spPr/>
-        <p:txBody>
-          <a:bodyPr/>
-          <a:lstStyle/>
-          <a:p>
-            <a:r>
-              <a:rPr lang="pt-BR" dirty="0"/>
-              <a:t>Implementação em Java</a:t>
-            </a:r>
-          </a:p>
-        </p:txBody>
-      </p:sp>
-      <p:sp>
-        <p:nvSpPr>
-          <p:cNvPr id="3" name="Content Placeholder 2">
-            <a:extLst>
-              <a:ext uri="{FF2B5EF4-FFF2-40B4-BE49-F238E27FC236}">
-                <a16:creationId xmlns:a16="http://schemas.microsoft.com/office/drawing/2014/main" id="{D543E113-619D-4DEB-AB51-C2FC2E38F3DD}"/>
-              </a:ext>
-            </a:extLst>
-          </p:cNvPr>
-          <p:cNvSpPr>
-            <a:spLocks noGrp="1"/>
-          </p:cNvSpPr>
-          <p:nvPr>
-            <p:ph idx="1"/>
-          </p:nvPr>
-        </p:nvSpPr>
-        <p:spPr/>
-        <p:txBody>
-          <a:bodyPr/>
-          <a:lstStyle/>
-          <a:p>
-            <a:r>
-              <a:rPr lang="pt-BR" dirty="0"/>
-              <a:t>Para solução do problema, foi implementado dois algoritmos:</a:t>
-            </a:r>
-          </a:p>
-          <a:p>
-            <a:r>
-              <a:rPr lang="pt-BR" dirty="0" err="1"/>
-              <a:t>Dijkstra's</a:t>
-            </a:r>
-            <a:r>
-              <a:rPr lang="pt-BR" dirty="0"/>
-              <a:t> adaptado para contabilizar latência</a:t>
-            </a:r>
-          </a:p>
-          <a:p>
-            <a:endParaRPr lang="pt-BR" dirty="0"/>
-          </a:p>
-          <a:p>
-            <a:r>
-              <a:rPr lang="pt-BR" dirty="0"/>
-              <a:t>Algoritmo Genético com PMX crossover e mutação de troca</a:t>
-            </a:r>
-          </a:p>
-          <a:p>
-            <a:endParaRPr lang="pt-BR" dirty="0"/>
-          </a:p>
-        </p:txBody>
-      </p:sp>
-    </p:spTree>
-    <p:extLst>
-      <p:ext uri="{BB962C8B-B14F-4D97-AF65-F5344CB8AC3E}">
-        <p14:creationId xmlns:p14="http://schemas.microsoft.com/office/powerpoint/2010/main" val="479512562"/>
-      </p:ext>
-    </p:extLst>
-  </p:cSld>
-  <p:clrMapOvr>
-    <a:masterClrMapping/>
-  </p:clrMapOvr>
-</p:sld>
-</file>
-
-<file path=ppt/slides/slide3.xml><?xml version="1.0" encoding="utf-8"?>
-<p:sld xmlns:a="http://schemas.openxmlformats.org/drawingml/2006/main" xmlns:r="http://schemas.openxmlformats.org/officeDocument/2006/relationships" xmlns:p="http://schemas.openxmlformats.org/presentationml/2006/main">
-  <p:cSld>
-    <p:spTree>
-      <p:nvGrpSpPr>
-        <p:cNvPr id="1" name=""/>
-        <p:cNvGrpSpPr/>
-        <p:nvPr/>
-      </p:nvGrpSpPr>
-      <p:grpSpPr>
-        <a:xfrm>
-          <a:off x="0" y="0"/>
-          <a:ext cx="0" cy="0"/>
-          <a:chOff x="0" y="0"/>
-          <a:chExt cx="0" cy="0"/>
-        </a:xfrm>
-      </p:grpSpPr>
-      <p:sp>
-        <p:nvSpPr>
-          <p:cNvPr id="2" name="Title 1">
-            <a:extLst>
-              <a:ext uri="{FF2B5EF4-FFF2-40B4-BE49-F238E27FC236}">
-                <a16:creationId xmlns:a16="http://schemas.microsoft.com/office/drawing/2014/main" id="{0A8C2E8E-FFB9-4AEF-9667-CD351BDD0524}"/>
-              </a:ext>
-            </a:extLst>
-          </p:cNvPr>
-          <p:cNvSpPr>
-            <a:spLocks noGrp="1"/>
-          </p:cNvSpPr>
-          <p:nvPr>
-            <p:ph type="title"/>
-          </p:nvPr>
-        </p:nvSpPr>
-        <p:spPr/>
-        <p:txBody>
-          <a:bodyPr/>
-          <a:lstStyle/>
-          <a:p>
-            <a:r>
-              <a:rPr lang="pt-BR" dirty="0" err="1"/>
-              <a:t>Dijkstra's</a:t>
-            </a:r>
-            <a:r>
-              <a:rPr lang="pt-BR" dirty="0"/>
-              <a:t> contabilizando latência</a:t>
-            </a:r>
-          </a:p>
-        </p:txBody>
-      </p:sp>
-      <p:sp>
-        <p:nvSpPr>
-          <p:cNvPr id="3" name="Content Placeholder 2">
-            <a:extLst>
-              <a:ext uri="{FF2B5EF4-FFF2-40B4-BE49-F238E27FC236}">
-                <a16:creationId xmlns:a16="http://schemas.microsoft.com/office/drawing/2014/main" id="{EF8F2F8C-DB83-407A-9677-D6D87BD97D17}"/>
-              </a:ext>
-            </a:extLst>
-          </p:cNvPr>
-          <p:cNvSpPr>
-            <a:spLocks noGrp="1"/>
-          </p:cNvSpPr>
-          <p:nvPr>
-            <p:ph idx="1"/>
-          </p:nvPr>
-        </p:nvSpPr>
-        <p:spPr/>
-        <p:txBody>
-          <a:bodyPr/>
-          <a:lstStyle/>
-          <a:p>
-            <a:r>
-              <a:rPr lang="pt-BR" dirty="0"/>
-              <a:t>Foi implementado um algoritmo guloso que é uma implementação do algoritmo </a:t>
-            </a:r>
-            <a:r>
-              <a:rPr lang="pt-BR" dirty="0" err="1"/>
-              <a:t>Dijkstra's</a:t>
-            </a:r>
-            <a:r>
-              <a:rPr lang="pt-BR" dirty="0"/>
-              <a:t> com a adaptação de guardar a latência de cada nó visitado, durante sua visita.</a:t>
-            </a:r>
-          </a:p>
-          <a:p>
-            <a:r>
-              <a:rPr lang="pt-BR" dirty="0"/>
-              <a:t>Pela natureza do algoritmo guloso, o percurso guloso foi sempre o mesmo devido a previsibilidade de andar sempre para o nó mais próximo.</a:t>
-            </a:r>
-          </a:p>
-          <a:p>
-            <a:endParaRPr lang="pt-BR" dirty="0"/>
-          </a:p>
-          <a:p>
-            <a:endParaRPr lang="pt-BR" dirty="0"/>
-          </a:p>
-        </p:txBody>
-      </p:sp>
-    </p:spTree>
-    <p:extLst>
-      <p:ext uri="{BB962C8B-B14F-4D97-AF65-F5344CB8AC3E}">
-        <p14:creationId xmlns:p14="http://schemas.microsoft.com/office/powerpoint/2010/main" val="1759375873"/>
-      </p:ext>
-    </p:extLst>
-  </p:cSld>
-  <p:clrMapOvr>
-    <a:masterClrMapping/>
-  </p:clrMapOvr>
-</p:sld>
-</file>
-
-<file path=ppt/slides/slide4.xml><?xml version="1.0" encoding="utf-8"?>
-<p:sld xmlns:a="http://schemas.openxmlformats.org/drawingml/2006/main" xmlns:r="http://schemas.openxmlformats.org/officeDocument/2006/relationships" xmlns:p="http://schemas.openxmlformats.org/presentationml/2006/main">
-  <p:cSld>
-    <p:spTree>
-      <p:nvGrpSpPr>
-        <p:cNvPr id="1" name=""/>
-        <p:cNvGrpSpPr/>
-        <p:nvPr/>
-      </p:nvGrpSpPr>
-      <p:grpSpPr>
-        <a:xfrm>
-          <a:off x="0" y="0"/>
-          <a:ext cx="0" cy="0"/>
-          <a:chOff x="0" y="0"/>
-          <a:chExt cx="0" cy="0"/>
-        </a:xfrm>
-      </p:grpSpPr>
-      <p:sp>
-        <p:nvSpPr>
-          <p:cNvPr id="2" name="Title 1">
-            <a:extLst>
-              <a:ext uri="{FF2B5EF4-FFF2-40B4-BE49-F238E27FC236}">
-                <a16:creationId xmlns:a16="http://schemas.microsoft.com/office/drawing/2014/main" id="{0A8C2E8E-FFB9-4AEF-9667-CD351BDD0524}"/>
-              </a:ext>
-            </a:extLst>
-          </p:cNvPr>
-          <p:cNvSpPr>
-            <a:spLocks noGrp="1"/>
-          </p:cNvSpPr>
-          <p:nvPr>
-            <p:ph type="title"/>
-          </p:nvPr>
-        </p:nvSpPr>
-        <p:spPr/>
-        <p:txBody>
-          <a:bodyPr/>
-          <a:lstStyle/>
-          <a:p>
-            <a:r>
-              <a:rPr lang="pt-BR" dirty="0" err="1"/>
-              <a:t>Dijkstra’s</a:t>
-            </a:r>
-            <a:r>
-              <a:rPr lang="pt-BR" dirty="0"/>
-              <a:t> contabilizando latência</a:t>
-            </a:r>
-          </a:p>
-        </p:txBody>
-      </p:sp>
-      <p:sp>
-        <p:nvSpPr>
-          <p:cNvPr id="3" name="Content Placeholder 2">
-            <a:extLst>
-              <a:ext uri="{FF2B5EF4-FFF2-40B4-BE49-F238E27FC236}">
-                <a16:creationId xmlns:a16="http://schemas.microsoft.com/office/drawing/2014/main" id="{EF8F2F8C-DB83-407A-9677-D6D87BD97D17}"/>
-              </a:ext>
-            </a:extLst>
-          </p:cNvPr>
-          <p:cNvSpPr>
-            <a:spLocks noGrp="1"/>
-          </p:cNvSpPr>
-          <p:nvPr>
-            <p:ph idx="1"/>
-          </p:nvPr>
-        </p:nvSpPr>
-        <p:spPr/>
-        <p:txBody>
-          <a:bodyPr/>
-          <a:lstStyle/>
-          <a:p>
-            <a:endParaRPr lang="pt-BR" dirty="0"/>
-          </a:p>
-          <a:p>
-            <a:endParaRPr lang="pt-BR" dirty="0"/>
-          </a:p>
-        </p:txBody>
-      </p:sp>
-      <p:pic>
-        <p:nvPicPr>
-          <p:cNvPr id="4" name="Picture 3">
-            <a:extLst>
-              <a:ext uri="{FF2B5EF4-FFF2-40B4-BE49-F238E27FC236}">
-                <a16:creationId xmlns:a16="http://schemas.microsoft.com/office/drawing/2014/main" id="{9914F444-BBBE-4165-86DB-AC0A135998F7}"/>
-              </a:ext>
-            </a:extLst>
-          </p:cNvPr>
-          <p:cNvPicPr>
-            <a:picLocks noChangeAspect="1"/>
-          </p:cNvPicPr>
-          <p:nvPr/>
-        </p:nvPicPr>
-        <p:blipFill>
-          <a:blip r:embed="rId2"/>
-          <a:stretch>
-            <a:fillRect/>
-          </a:stretch>
-        </p:blipFill>
-        <p:spPr>
-          <a:xfrm>
-            <a:off x="2371725" y="1411436"/>
-            <a:ext cx="5621655" cy="4765527"/>
-          </a:xfrm>
-          <a:prstGeom prst="rect">
-            <a:avLst/>
-          </a:prstGeom>
-        </p:spPr>
-      </p:pic>
-    </p:spTree>
-    <p:extLst>
-      <p:ext uri="{BB962C8B-B14F-4D97-AF65-F5344CB8AC3E}">
-        <p14:creationId xmlns:p14="http://schemas.microsoft.com/office/powerpoint/2010/main" val="1940600110"/>
-      </p:ext>
-    </p:extLst>
-  </p:cSld>
-  <p:clrMapOvr>
-    <a:masterClrMapping/>
-  </p:clrMapOvr>
-</p:sld>
-</file>
-
-<file path=ppt/slides/slide5.xml><?xml version="1.0" encoding="utf-8"?>
-<p:sld xmlns:a="http://schemas.openxmlformats.org/drawingml/2006/main" xmlns:r="http://schemas.openxmlformats.org/officeDocument/2006/relationships" xmlns:p="http://schemas.openxmlformats.org/presentationml/2006/main">
-  <p:cSld>
-    <p:spTree>
-      <p:nvGrpSpPr>
-        <p:cNvPr id="1" name=""/>
-        <p:cNvGrpSpPr/>
-        <p:nvPr/>
-      </p:nvGrpSpPr>
-      <p:grpSpPr>
-        <a:xfrm>
-          <a:off x="0" y="0"/>
-          <a:ext cx="0" cy="0"/>
-          <a:chOff x="0" y="0"/>
-          <a:chExt cx="0" cy="0"/>
-        </a:xfrm>
-      </p:grpSpPr>
-      <p:sp>
-        <p:nvSpPr>
-          <p:cNvPr id="2" name="Title 1">
-            <a:extLst>
-              <a:ext uri="{FF2B5EF4-FFF2-40B4-BE49-F238E27FC236}">
-                <a16:creationId xmlns:a16="http://schemas.microsoft.com/office/drawing/2014/main" id="{0A8C2E8E-FFB9-4AEF-9667-CD351BDD0524}"/>
-              </a:ext>
-            </a:extLst>
-          </p:cNvPr>
-          <p:cNvSpPr>
-            <a:spLocks noGrp="1"/>
-          </p:cNvSpPr>
-          <p:nvPr>
-            <p:ph type="title"/>
-          </p:nvPr>
-        </p:nvSpPr>
-        <p:spPr/>
-        <p:txBody>
-          <a:bodyPr/>
-          <a:lstStyle/>
-          <a:p>
-            <a:r>
-              <a:rPr lang="pt-BR" dirty="0"/>
-              <a:t>Algoritmo Genético com PMX crossover e mutação de troca</a:t>
-            </a:r>
-          </a:p>
-        </p:txBody>
-      </p:sp>
-      <p:sp>
-        <p:nvSpPr>
-          <p:cNvPr id="3" name="Content Placeholder 2">
-            <a:extLst>
-              <a:ext uri="{FF2B5EF4-FFF2-40B4-BE49-F238E27FC236}">
-                <a16:creationId xmlns:a16="http://schemas.microsoft.com/office/drawing/2014/main" id="{EF8F2F8C-DB83-407A-9677-D6D87BD97D17}"/>
-              </a:ext>
-            </a:extLst>
-          </p:cNvPr>
-          <p:cNvSpPr>
-            <a:spLocks noGrp="1"/>
-          </p:cNvSpPr>
-          <p:nvPr>
-            <p:ph idx="1"/>
-          </p:nvPr>
-        </p:nvSpPr>
-        <p:spPr>
-          <a:xfrm>
-            <a:off x="838200" y="1825624"/>
-            <a:ext cx="6145530" cy="4667251"/>
-          </a:xfrm>
-        </p:spPr>
-        <p:txBody>
-          <a:bodyPr/>
-          <a:lstStyle/>
-          <a:p>
-            <a:r>
-              <a:rPr lang="pt-BR" dirty="0" err="1"/>
-              <a:t>Metaheurística</a:t>
-            </a:r>
-            <a:r>
-              <a:rPr lang="pt-BR" dirty="0"/>
-              <a:t> selecionada foi um algoritmo genético.</a:t>
-            </a:r>
-          </a:p>
-          <a:p>
-            <a:r>
-              <a:rPr lang="pt-BR" dirty="0"/>
-              <a:t>Crossover Mapeado Parcialmente (PMX) . Foi usado um vetor de reposicionamento para lidar com as colisões dos genes fora do segmento cortado durante o PMX.</a:t>
-            </a:r>
-          </a:p>
-          <a:p>
-            <a:endParaRPr lang="pt-BR" dirty="0"/>
-          </a:p>
-          <a:p>
-            <a:endParaRPr lang="pt-BR" dirty="0"/>
-          </a:p>
-        </p:txBody>
-      </p:sp>
-      <p:pic>
-        <p:nvPicPr>
-          <p:cNvPr id="5" name="Picture 4">
-            <a:extLst>
-              <a:ext uri="{FF2B5EF4-FFF2-40B4-BE49-F238E27FC236}">
-                <a16:creationId xmlns:a16="http://schemas.microsoft.com/office/drawing/2014/main" id="{C3A224A8-E583-47C5-8958-261F092D271E}"/>
-              </a:ext>
-            </a:extLst>
-          </p:cNvPr>
-          <p:cNvPicPr>
-            <a:picLocks noChangeAspect="1"/>
-          </p:cNvPicPr>
-          <p:nvPr/>
-        </p:nvPicPr>
-        <p:blipFill>
-          <a:blip r:embed="rId2"/>
-          <a:stretch>
-            <a:fillRect/>
-          </a:stretch>
-        </p:blipFill>
-        <p:spPr>
-          <a:xfrm>
-            <a:off x="6983730" y="1690688"/>
-            <a:ext cx="4686300" cy="4591050"/>
-          </a:xfrm>
-          <a:prstGeom prst="rect">
-            <a:avLst/>
-          </a:prstGeom>
-        </p:spPr>
-      </p:pic>
-    </p:spTree>
-    <p:extLst>
-      <p:ext uri="{BB962C8B-B14F-4D97-AF65-F5344CB8AC3E}">
-        <p14:creationId xmlns:p14="http://schemas.microsoft.com/office/powerpoint/2010/main" val="4136231959"/>
-      </p:ext>
-    </p:extLst>
-  </p:cSld>
-  <p:clrMapOvr>
-    <a:masterClrMapping/>
-  </p:clrMapOvr>
-</p:sld>
-</file>
-
-<file path=ppt/slides/slide6.xml><?xml version="1.0" encoding="utf-8"?>
-<p:sld xmlns:a="http://schemas.openxmlformats.org/drawingml/2006/main" xmlns:r="http://schemas.openxmlformats.org/officeDocument/2006/relationships" xmlns:p="http://schemas.openxmlformats.org/presentationml/2006/main">
-  <p:cSld>
-    <p:spTree>
-      <p:nvGrpSpPr>
-        <p:cNvPr id="1" name=""/>
-        <p:cNvGrpSpPr/>
-        <p:nvPr/>
-      </p:nvGrpSpPr>
-      <p:grpSpPr>
-        <a:xfrm>
-          <a:off x="0" y="0"/>
-          <a:ext cx="0" cy="0"/>
-          <a:chOff x="0" y="0"/>
-          <a:chExt cx="0" cy="0"/>
-        </a:xfrm>
-      </p:grpSpPr>
-      <p:sp>
-        <p:nvSpPr>
-          <p:cNvPr id="2" name="Title 1">
-            <a:extLst>
-              <a:ext uri="{FF2B5EF4-FFF2-40B4-BE49-F238E27FC236}">
-                <a16:creationId xmlns:a16="http://schemas.microsoft.com/office/drawing/2014/main" id="{0A8C2E8E-FFB9-4AEF-9667-CD351BDD0524}"/>
-              </a:ext>
-            </a:extLst>
-          </p:cNvPr>
-          <p:cNvSpPr>
-            <a:spLocks noGrp="1"/>
-          </p:cNvSpPr>
-          <p:nvPr>
-            <p:ph type="title"/>
-          </p:nvPr>
-        </p:nvSpPr>
-        <p:spPr/>
-        <p:txBody>
-          <a:bodyPr/>
-          <a:lstStyle/>
-          <a:p>
-            <a:r>
-              <a:rPr lang="pt-BR" dirty="0"/>
-              <a:t>Geração de indivíduos</a:t>
-            </a:r>
-          </a:p>
-        </p:txBody>
-      </p:sp>
-      <p:sp>
-        <p:nvSpPr>
-          <p:cNvPr id="3" name="Content Placeholder 2">
-            <a:extLst>
-              <a:ext uri="{FF2B5EF4-FFF2-40B4-BE49-F238E27FC236}">
-                <a16:creationId xmlns:a16="http://schemas.microsoft.com/office/drawing/2014/main" id="{EF8F2F8C-DB83-407A-9677-D6D87BD97D17}"/>
-              </a:ext>
-            </a:extLst>
-          </p:cNvPr>
-          <p:cNvSpPr>
-            <a:spLocks noGrp="1"/>
-          </p:cNvSpPr>
-          <p:nvPr>
-            <p:ph idx="1"/>
-          </p:nvPr>
-        </p:nvSpPr>
-        <p:spPr>
-          <a:xfrm>
-            <a:off x="838200" y="1825624"/>
-            <a:ext cx="6145530" cy="4667251"/>
-          </a:xfrm>
-        </p:spPr>
-        <p:txBody>
-          <a:bodyPr/>
-          <a:lstStyle/>
-          <a:p>
-            <a:r>
-              <a:rPr lang="pt-BR" dirty="0"/>
-              <a:t> A primeira geração contem caminhos aleatórios acrescentado, porem foi acrescentado o caminho da solução gulosa, visto que sabemos que ela é comparativamente melhor que os primeiros indivíduos aleatórios, para que comecemos com pelo menos um pai bom.</a:t>
-            </a:r>
-          </a:p>
-          <a:p>
-            <a:endParaRPr lang="pt-BR" dirty="0"/>
-          </a:p>
-          <a:p>
-            <a:endParaRPr lang="pt-BR" dirty="0"/>
-          </a:p>
-        </p:txBody>
-      </p:sp>
-      <p:pic>
-        <p:nvPicPr>
-          <p:cNvPr id="6" name="Picture 5">
-            <a:extLst>
-              <a:ext uri="{FF2B5EF4-FFF2-40B4-BE49-F238E27FC236}">
-                <a16:creationId xmlns:a16="http://schemas.microsoft.com/office/drawing/2014/main" id="{E3D61BD8-D0C7-415C-930D-132D9B60DB03}"/>
-              </a:ext>
-            </a:extLst>
-          </p:cNvPr>
-          <p:cNvPicPr>
-            <a:picLocks noChangeAspect="1"/>
-          </p:cNvPicPr>
-          <p:nvPr/>
-        </p:nvPicPr>
-        <p:blipFill>
-          <a:blip r:embed="rId2"/>
-          <a:stretch>
-            <a:fillRect/>
-          </a:stretch>
-        </p:blipFill>
-        <p:spPr>
-          <a:xfrm>
-            <a:off x="6983730" y="1774306"/>
-            <a:ext cx="4699046" cy="2553997"/>
-          </a:xfrm>
-          <a:prstGeom prst="rect">
-            <a:avLst/>
-          </a:prstGeom>
-        </p:spPr>
-      </p:pic>
-    </p:spTree>
-    <p:extLst>
-      <p:ext uri="{BB962C8B-B14F-4D97-AF65-F5344CB8AC3E}">
-        <p14:creationId xmlns:p14="http://schemas.microsoft.com/office/powerpoint/2010/main" val="1145190765"/>
-      </p:ext>
-    </p:extLst>
-  </p:cSld>
-  <p:clrMapOvr>
-    <a:masterClrMapping/>
-  </p:clrMapOvr>
-</p:sld>
-</file>
-
-<file path=ppt/slides/slide7.xml><?xml version="1.0" encoding="utf-8"?>
-<p:sld xmlns:a="http://schemas.openxmlformats.org/drawingml/2006/main" xmlns:r="http://schemas.openxmlformats.org/officeDocument/2006/relationships" xmlns:p="http://schemas.openxmlformats.org/presentationml/2006/main">
-  <p:cSld>
-    <p:spTree>
-      <p:nvGrpSpPr>
-        <p:cNvPr id="1" name=""/>
-        <p:cNvGrpSpPr/>
-        <p:nvPr/>
-      </p:nvGrpSpPr>
-      <p:grpSpPr>
-        <a:xfrm>
-          <a:off x="0" y="0"/>
-          <a:ext cx="0" cy="0"/>
-          <a:chOff x="0" y="0"/>
-          <a:chExt cx="0" cy="0"/>
-        </a:xfrm>
-      </p:grpSpPr>
-      <p:sp>
-        <p:nvSpPr>
-          <p:cNvPr id="2" name="Title 1">
-            <a:extLst>
-              <a:ext uri="{FF2B5EF4-FFF2-40B4-BE49-F238E27FC236}">
-                <a16:creationId xmlns:a16="http://schemas.microsoft.com/office/drawing/2014/main" id="{0A8C2E8E-FFB9-4AEF-9667-CD351BDD0524}"/>
-              </a:ext>
-            </a:extLst>
-          </p:cNvPr>
-          <p:cNvSpPr>
-            <a:spLocks noGrp="1"/>
-          </p:cNvSpPr>
-          <p:nvPr>
-            <p:ph type="title"/>
-          </p:nvPr>
-        </p:nvSpPr>
-        <p:spPr/>
-        <p:txBody>
-          <a:bodyPr/>
-          <a:lstStyle/>
-          <a:p>
-            <a:r>
-              <a:rPr lang="pt-BR" dirty="0"/>
-              <a:t>Função heurística</a:t>
-            </a:r>
-          </a:p>
-        </p:txBody>
-      </p:sp>
-      <p:sp>
-        <p:nvSpPr>
-          <p:cNvPr id="3" name="Content Placeholder 2">
-            <a:extLst>
-              <a:ext uri="{FF2B5EF4-FFF2-40B4-BE49-F238E27FC236}">
-                <a16:creationId xmlns:a16="http://schemas.microsoft.com/office/drawing/2014/main" id="{EF8F2F8C-DB83-407A-9677-D6D87BD97D17}"/>
-              </a:ext>
-            </a:extLst>
-          </p:cNvPr>
-          <p:cNvSpPr>
-            <a:spLocks noGrp="1"/>
-          </p:cNvSpPr>
-          <p:nvPr>
-            <p:ph idx="1"/>
-          </p:nvPr>
-        </p:nvSpPr>
-        <p:spPr>
-          <a:xfrm>
-            <a:off x="698240" y="3159903"/>
-            <a:ext cx="11235613" cy="3110268"/>
-          </a:xfrm>
-        </p:spPr>
-        <p:txBody>
-          <a:bodyPr>
-            <a:normAutofit/>
-          </a:bodyPr>
-          <a:lstStyle/>
-          <a:p>
-            <a:r>
-              <a:rPr lang="pt-BR" dirty="0"/>
-              <a:t>A função heurística considerada foi a própria latência total do caminho, e usamos o paradigma de que não sabíamos o ótimo/melhor latência alcançável (OPT/BKS), pois normalmente em problemas reais não saberíamos e por isso não usamos esse OPT/BKS na função heurística.</a:t>
-            </a:r>
-          </a:p>
-          <a:p>
-            <a:pPr marL="0" indent="0">
-              <a:buNone/>
-            </a:pPr>
-            <a:endParaRPr lang="pt-BR" dirty="0"/>
-          </a:p>
-          <a:p>
-            <a:endParaRPr lang="pt-BR" dirty="0"/>
-          </a:p>
-        </p:txBody>
-      </p:sp>
-      <p:pic>
-        <p:nvPicPr>
-          <p:cNvPr id="5" name="Picture 4">
-            <a:extLst>
-              <a:ext uri="{FF2B5EF4-FFF2-40B4-BE49-F238E27FC236}">
-                <a16:creationId xmlns:a16="http://schemas.microsoft.com/office/drawing/2014/main" id="{BD78751A-5E15-4FBC-B3F8-F8FBD006FABD}"/>
-              </a:ext>
-            </a:extLst>
-          </p:cNvPr>
-          <p:cNvPicPr>
-            <a:picLocks noChangeAspect="1"/>
-          </p:cNvPicPr>
-          <p:nvPr/>
-        </p:nvPicPr>
-        <p:blipFill>
-          <a:blip r:embed="rId2"/>
-          <a:stretch>
-            <a:fillRect/>
-          </a:stretch>
-        </p:blipFill>
-        <p:spPr>
-          <a:xfrm>
-            <a:off x="1144814" y="1540653"/>
-            <a:ext cx="8858250" cy="1619250"/>
-          </a:xfrm>
-          <a:prstGeom prst="rect">
-            <a:avLst/>
-          </a:prstGeom>
-        </p:spPr>
-      </p:pic>
-    </p:spTree>
-    <p:extLst>
-      <p:ext uri="{BB962C8B-B14F-4D97-AF65-F5344CB8AC3E}">
-        <p14:creationId xmlns:p14="http://schemas.microsoft.com/office/powerpoint/2010/main" val="4214817213"/>
-      </p:ext>
-    </p:extLst>
-  </p:cSld>
-  <p:clrMapOvr>
-    <a:masterClrMapping/>
-  </p:clrMapOvr>
-</p:sld>
-</file>
-
-<file path=ppt/slides/slide8.xml><?xml version="1.0" encoding="utf-8"?>
-<p:sld xmlns:a="http://schemas.openxmlformats.org/drawingml/2006/main" xmlns:r="http://schemas.openxmlformats.org/officeDocument/2006/relationships" xmlns:p="http://schemas.openxmlformats.org/presentationml/2006/main">
-  <p:cSld>
-    <p:spTree>
-      <p:nvGrpSpPr>
-        <p:cNvPr id="1" name=""/>
-        <p:cNvGrpSpPr/>
-        <p:nvPr/>
-      </p:nvGrpSpPr>
-      <p:grpSpPr>
-        <a:xfrm>
-          <a:off x="0" y="0"/>
-          <a:ext cx="0" cy="0"/>
-          <a:chOff x="0" y="0"/>
-          <a:chExt cx="0" cy="0"/>
-        </a:xfrm>
-      </p:grpSpPr>
-      <p:sp>
-        <p:nvSpPr>
-          <p:cNvPr id="2" name="Title 1">
-            <a:extLst>
-              <a:ext uri="{FF2B5EF4-FFF2-40B4-BE49-F238E27FC236}">
-                <a16:creationId xmlns:a16="http://schemas.microsoft.com/office/drawing/2014/main" id="{FF5A4DB1-33AE-4011-B0E9-463D3BCC4B6C}"/>
-              </a:ext>
-            </a:extLst>
-          </p:cNvPr>
-          <p:cNvSpPr>
-            <a:spLocks noGrp="1"/>
-          </p:cNvSpPr>
-          <p:nvPr>
-            <p:ph type="title"/>
-          </p:nvPr>
-        </p:nvSpPr>
-        <p:spPr>
-          <a:xfrm>
-            <a:off x="838200" y="365125"/>
-            <a:ext cx="2212910" cy="1325563"/>
-          </a:xfrm>
-        </p:spPr>
-        <p:txBody>
-          <a:bodyPr/>
-          <a:lstStyle/>
-          <a:p>
-            <a:r>
-              <a:rPr lang="en-US" dirty="0" err="1"/>
-              <a:t>Sele</a:t>
-            </a:r>
-            <a:r>
-              <a:rPr lang="pt-BR" dirty="0"/>
-              <a:t>ç</a:t>
-            </a:r>
-            <a:r>
-              <a:rPr lang="en-US" dirty="0" err="1"/>
-              <a:t>ão</a:t>
-            </a:r>
-            <a:r>
-              <a:rPr lang="en-US" dirty="0"/>
-              <a:t> dos </a:t>
-            </a:r>
-            <a:r>
-              <a:rPr lang="en-US" dirty="0" err="1"/>
-              <a:t>pais</a:t>
-            </a:r>
-            <a:endParaRPr lang="pt-BR" dirty="0"/>
-          </a:p>
-        </p:txBody>
-      </p:sp>
-      <p:sp>
-        <p:nvSpPr>
-          <p:cNvPr id="3" name="Content Placeholder 2">
-            <a:extLst>
-              <a:ext uri="{FF2B5EF4-FFF2-40B4-BE49-F238E27FC236}">
-                <a16:creationId xmlns:a16="http://schemas.microsoft.com/office/drawing/2014/main" id="{C6F617BA-4FF5-44F9-993D-4CD585C84695}"/>
-              </a:ext>
-            </a:extLst>
-          </p:cNvPr>
-          <p:cNvSpPr>
-            <a:spLocks noGrp="1"/>
-          </p:cNvSpPr>
-          <p:nvPr>
-            <p:ph idx="1"/>
-          </p:nvPr>
-        </p:nvSpPr>
-        <p:spPr>
-          <a:xfrm>
-            <a:off x="627483" y="2947988"/>
-            <a:ext cx="10937033" cy="3810065"/>
-          </a:xfrm>
-        </p:spPr>
-        <p:txBody>
-          <a:bodyPr>
-            <a:normAutofit/>
-          </a:bodyPr>
-          <a:lstStyle/>
-          <a:p>
-            <a:r>
-              <a:rPr lang="pt-BR" dirty="0"/>
-              <a:t>A seleção dos pais que iriam procriar foi implementada ordenando os melhores pais, e sempre pegando os X melhores pais, porem como foi aprendido em aula que é bom ter pais não necessariamente bons, foi adicionado a listagem de pais Y filhos com índice que não estavam entre esses melhores pais, assim adicionando sempre um numero fixo de filhos não ótimos e assim mantendo a variabilidade nos indivíduos em cada geração de maneira bem simples.</a:t>
-            </a:r>
-          </a:p>
-          <a:p>
-            <a:endParaRPr lang="pt-BR" dirty="0"/>
-          </a:p>
-        </p:txBody>
-      </p:sp>
-      <p:pic>
-        <p:nvPicPr>
-          <p:cNvPr id="5" name="Picture 4">
-            <a:extLst>
-              <a:ext uri="{FF2B5EF4-FFF2-40B4-BE49-F238E27FC236}">
-                <a16:creationId xmlns:a16="http://schemas.microsoft.com/office/drawing/2014/main" id="{7C1A3641-EA3D-4680-BFEE-E6548520B858}"/>
-              </a:ext>
-            </a:extLst>
-          </p:cNvPr>
-          <p:cNvPicPr>
-            <a:picLocks noChangeAspect="1"/>
-          </p:cNvPicPr>
-          <p:nvPr/>
-        </p:nvPicPr>
-        <p:blipFill>
-          <a:blip r:embed="rId2"/>
-          <a:stretch>
-            <a:fillRect/>
-          </a:stretch>
-        </p:blipFill>
-        <p:spPr>
-          <a:xfrm>
-            <a:off x="3517709" y="433388"/>
-            <a:ext cx="8239125" cy="2514600"/>
-          </a:xfrm>
-          <a:prstGeom prst="rect">
-            <a:avLst/>
-          </a:prstGeom>
-        </p:spPr>
-      </p:pic>
-    </p:spTree>
-    <p:extLst>
-      <p:ext uri="{BB962C8B-B14F-4D97-AF65-F5344CB8AC3E}">
-        <p14:creationId xmlns:p14="http://schemas.microsoft.com/office/powerpoint/2010/main" val="3170235124"/>
-      </p:ext>
-    </p:extLst>
-  </p:cSld>
-  <p:clrMapOvr>
-    <a:masterClrMapping/>
-  </p:clrMapOvr>
-</p:sld>
-</file>
-
-<file path=ppt/slides/slide9.xml><?xml version="1.0" encoding="utf-8"?>
-<p:sld xmlns:a="http://schemas.openxmlformats.org/drawingml/2006/main" xmlns:r="http://schemas.openxmlformats.org/officeDocument/2006/relationships" xmlns:p="http://schemas.openxmlformats.org/presentationml/2006/main">
-  <p:cSld>
-    <p:spTree>
-      <p:nvGrpSpPr>
-        <p:cNvPr id="1" name=""/>
-        <p:cNvGrpSpPr/>
-        <p:nvPr/>
-      </p:nvGrpSpPr>
-      <p:grpSpPr>
-        <a:xfrm>
-          <a:off x="0" y="0"/>
-          <a:ext cx="0" cy="0"/>
-          <a:chOff x="0" y="0"/>
-          <a:chExt cx="0" cy="0"/>
-        </a:xfrm>
-      </p:grpSpPr>
-      <p:sp>
-        <p:nvSpPr>
-          <p:cNvPr id="2" name="Title 1">
-            <a:extLst>
-              <a:ext uri="{FF2B5EF4-FFF2-40B4-BE49-F238E27FC236}">
                 <a16:creationId xmlns:a16="http://schemas.microsoft.com/office/drawing/2014/main" id="{7309BF44-5986-47A3-9F86-BC30821BD516}"/>
               </a:ext>
             </a:extLst>
@@ -6787,6 +5747,1186 @@
     <p:extLst>
       <p:ext uri="{BB962C8B-B14F-4D97-AF65-F5344CB8AC3E}">
         <p14:creationId xmlns:p14="http://schemas.microsoft.com/office/powerpoint/2010/main" val="53148001"/>
+      </p:ext>
+    </p:extLst>
+  </p:cSld>
+  <p:clrMapOvr>
+    <a:masterClrMapping/>
+  </p:clrMapOvr>
+</p:sld>
+</file>
+
+<file path=ppt/slides/slide11.xml><?xml version="1.0" encoding="utf-8"?>
+<p:sld xmlns:a="http://schemas.openxmlformats.org/drawingml/2006/main" xmlns:r="http://schemas.openxmlformats.org/officeDocument/2006/relationships" xmlns:p="http://schemas.openxmlformats.org/presentationml/2006/main">
+  <p:cSld>
+    <p:spTree>
+      <p:nvGrpSpPr>
+        <p:cNvPr id="1" name=""/>
+        <p:cNvGrpSpPr/>
+        <p:nvPr/>
+      </p:nvGrpSpPr>
+      <p:grpSpPr>
+        <a:xfrm>
+          <a:off x="0" y="0"/>
+          <a:ext cx="0" cy="0"/>
+          <a:chOff x="0" y="0"/>
+          <a:chExt cx="0" cy="0"/>
+        </a:xfrm>
+      </p:grpSpPr>
+      <p:sp>
+        <p:nvSpPr>
+          <p:cNvPr id="2" name="Title 1">
+            <a:extLst>
+              <a:ext uri="{FF2B5EF4-FFF2-40B4-BE49-F238E27FC236}">
+                <a16:creationId xmlns:a16="http://schemas.microsoft.com/office/drawing/2014/main" id="{E101AA06-EB15-459D-BDB1-46F7AC4EC704}"/>
+              </a:ext>
+            </a:extLst>
+          </p:cNvPr>
+          <p:cNvSpPr>
+            <a:spLocks noGrp="1"/>
+          </p:cNvSpPr>
+          <p:nvPr>
+            <p:ph type="title"/>
+          </p:nvPr>
+        </p:nvSpPr>
+        <p:spPr/>
+        <p:txBody>
+          <a:bodyPr/>
+          <a:lstStyle/>
+          <a:p>
+            <a:r>
+              <a:rPr lang="en-US" dirty="0" err="1"/>
+              <a:t>Resultados</a:t>
+            </a:r>
+            <a:endParaRPr lang="pt-BR" dirty="0"/>
+          </a:p>
+        </p:txBody>
+      </p:sp>
+      <p:sp>
+        <p:nvSpPr>
+          <p:cNvPr id="3" name="Content Placeholder 2">
+            <a:extLst>
+              <a:ext uri="{FF2B5EF4-FFF2-40B4-BE49-F238E27FC236}">
+                <a16:creationId xmlns:a16="http://schemas.microsoft.com/office/drawing/2014/main" id="{1074435D-1642-4487-A46D-CD7DBDC98956}"/>
+              </a:ext>
+            </a:extLst>
+          </p:cNvPr>
+          <p:cNvSpPr>
+            <a:spLocks noGrp="1"/>
+          </p:cNvSpPr>
+          <p:nvPr>
+            <p:ph idx="1"/>
+          </p:nvPr>
+        </p:nvSpPr>
+        <p:spPr/>
+        <p:txBody>
+          <a:bodyPr/>
+          <a:lstStyle/>
+          <a:p>
+            <a:r>
+              <a:rPr lang="pt-BR" dirty="0"/>
+              <a:t>O nosso algoritmo genético teve melhoras significativas contra o guloso, porem mesmo com o aumento do número de gerações, não conseguimos nos mover mais perto do próximo do BKS/OPT que justificasse o aumento do tempo de execução. Não sabemos se o algoritmo funciona perfeitamente para sair de máximos locais, visto não fizemos estatística da geração de filhos.</a:t>
+            </a:r>
+          </a:p>
+          <a:p>
+            <a:endParaRPr lang="pt-BR" dirty="0"/>
+          </a:p>
+        </p:txBody>
+      </p:sp>
+    </p:spTree>
+    <p:extLst>
+      <p:ext uri="{BB962C8B-B14F-4D97-AF65-F5344CB8AC3E}">
+        <p14:creationId xmlns:p14="http://schemas.microsoft.com/office/powerpoint/2010/main" val="593808388"/>
+      </p:ext>
+    </p:extLst>
+  </p:cSld>
+  <p:clrMapOvr>
+    <a:masterClrMapping/>
+  </p:clrMapOvr>
+</p:sld>
+</file>
+
+<file path=ppt/slides/slide12.xml><?xml version="1.0" encoding="utf-8"?>
+<p:sld xmlns:a="http://schemas.openxmlformats.org/drawingml/2006/main" xmlns:r="http://schemas.openxmlformats.org/officeDocument/2006/relationships" xmlns:p="http://schemas.openxmlformats.org/presentationml/2006/main">
+  <p:cSld>
+    <p:spTree>
+      <p:nvGrpSpPr>
+        <p:cNvPr id="1" name=""/>
+        <p:cNvGrpSpPr/>
+        <p:nvPr/>
+      </p:nvGrpSpPr>
+      <p:grpSpPr>
+        <a:xfrm>
+          <a:off x="0" y="0"/>
+          <a:ext cx="0" cy="0"/>
+          <a:chOff x="0" y="0"/>
+          <a:chExt cx="0" cy="0"/>
+        </a:xfrm>
+      </p:grpSpPr>
+      <p:sp>
+        <p:nvSpPr>
+          <p:cNvPr id="2" name="Title 1">
+            <a:extLst>
+              <a:ext uri="{FF2B5EF4-FFF2-40B4-BE49-F238E27FC236}">
+                <a16:creationId xmlns:a16="http://schemas.microsoft.com/office/drawing/2014/main" id="{E101AA06-EB15-459D-BDB1-46F7AC4EC704}"/>
+              </a:ext>
+            </a:extLst>
+          </p:cNvPr>
+          <p:cNvSpPr>
+            <a:spLocks noGrp="1"/>
+          </p:cNvSpPr>
+          <p:nvPr>
+            <p:ph type="title"/>
+          </p:nvPr>
+        </p:nvSpPr>
+        <p:spPr/>
+        <p:txBody>
+          <a:bodyPr/>
+          <a:lstStyle/>
+          <a:p>
+            <a:r>
+              <a:rPr lang="en-US" dirty="0" err="1"/>
+              <a:t>Conclus</a:t>
+            </a:r>
+            <a:r>
+              <a:rPr lang="pt-BR" dirty="0" err="1"/>
+              <a:t>ão</a:t>
+            </a:r>
+            <a:endParaRPr lang="pt-BR" dirty="0"/>
+          </a:p>
+        </p:txBody>
+      </p:sp>
+      <p:sp>
+        <p:nvSpPr>
+          <p:cNvPr id="3" name="Content Placeholder 2">
+            <a:extLst>
+              <a:ext uri="{FF2B5EF4-FFF2-40B4-BE49-F238E27FC236}">
+                <a16:creationId xmlns:a16="http://schemas.microsoft.com/office/drawing/2014/main" id="{1074435D-1642-4487-A46D-CD7DBDC98956}"/>
+              </a:ext>
+            </a:extLst>
+          </p:cNvPr>
+          <p:cNvSpPr>
+            <a:spLocks noGrp="1"/>
+          </p:cNvSpPr>
+          <p:nvPr>
+            <p:ph idx="1"/>
+          </p:nvPr>
+        </p:nvSpPr>
+        <p:spPr/>
+        <p:txBody>
+          <a:bodyPr/>
+          <a:lstStyle/>
+          <a:p>
+            <a:r>
+              <a:rPr lang="pt-BR" dirty="0"/>
+              <a:t>A implementação do algoritmo genético foi bastante iterativa, usando conceitos aprendidos em aula. A implementação deu bastante margem para criatividade e iteração numérica nos valores para maximizar a eficiência do resultado.</a:t>
+            </a:r>
+          </a:p>
+          <a:p>
+            <a:r>
+              <a:rPr lang="pt-BR" dirty="0"/>
+              <a:t>Em problemas reais em que não se sabe qual o melhor possível, acreditamos que essa analise da performance e </a:t>
+            </a:r>
+            <a:r>
+              <a:rPr lang="pt-BR" dirty="0" err="1"/>
+              <a:t>corretude</a:t>
+            </a:r>
+            <a:r>
+              <a:rPr lang="pt-BR" dirty="0"/>
+              <a:t> do algoritmo se tornam bem mais complicados, pois ajudou muito saber qual o máximo ótimo, como parâmetro para guiar e ajustar o código e os parâmetros.</a:t>
+            </a:r>
+          </a:p>
+          <a:p>
+            <a:endParaRPr lang="pt-BR" dirty="0"/>
+          </a:p>
+        </p:txBody>
+      </p:sp>
+    </p:spTree>
+    <p:extLst>
+      <p:ext uri="{BB962C8B-B14F-4D97-AF65-F5344CB8AC3E}">
+        <p14:creationId xmlns:p14="http://schemas.microsoft.com/office/powerpoint/2010/main" val="2419190334"/>
+      </p:ext>
+    </p:extLst>
+  </p:cSld>
+  <p:clrMapOvr>
+    <a:masterClrMapping/>
+  </p:clrMapOvr>
+</p:sld>
+</file>
+
+<file path=ppt/slides/slide2.xml><?xml version="1.0" encoding="utf-8"?>
+<p:sld xmlns:a="http://schemas.openxmlformats.org/drawingml/2006/main" xmlns:r="http://schemas.openxmlformats.org/officeDocument/2006/relationships" xmlns:p="http://schemas.openxmlformats.org/presentationml/2006/main">
+  <p:cSld>
+    <p:spTree>
+      <p:nvGrpSpPr>
+        <p:cNvPr id="1" name=""/>
+        <p:cNvGrpSpPr/>
+        <p:nvPr/>
+      </p:nvGrpSpPr>
+      <p:grpSpPr>
+        <a:xfrm>
+          <a:off x="0" y="0"/>
+          <a:ext cx="0" cy="0"/>
+          <a:chOff x="0" y="0"/>
+          <a:chExt cx="0" cy="0"/>
+        </a:xfrm>
+      </p:grpSpPr>
+      <p:sp>
+        <p:nvSpPr>
+          <p:cNvPr id="2" name="Title 1">
+            <a:extLst>
+              <a:ext uri="{FF2B5EF4-FFF2-40B4-BE49-F238E27FC236}">
+                <a16:creationId xmlns:a16="http://schemas.microsoft.com/office/drawing/2014/main" id="{A0FC46FC-D0FC-4B5F-8330-42A0C2D4899C}"/>
+              </a:ext>
+            </a:extLst>
+          </p:cNvPr>
+          <p:cNvSpPr>
+            <a:spLocks noGrp="1"/>
+          </p:cNvSpPr>
+          <p:nvPr>
+            <p:ph type="title"/>
+          </p:nvPr>
+        </p:nvSpPr>
+        <p:spPr/>
+        <p:txBody>
+          <a:bodyPr/>
+          <a:lstStyle/>
+          <a:p>
+            <a:r>
+              <a:rPr lang="pt-BR" dirty="0"/>
+              <a:t>Implementação em Java</a:t>
+            </a:r>
+          </a:p>
+        </p:txBody>
+      </p:sp>
+      <p:sp>
+        <p:nvSpPr>
+          <p:cNvPr id="3" name="Content Placeholder 2">
+            <a:extLst>
+              <a:ext uri="{FF2B5EF4-FFF2-40B4-BE49-F238E27FC236}">
+                <a16:creationId xmlns:a16="http://schemas.microsoft.com/office/drawing/2014/main" id="{D543E113-619D-4DEB-AB51-C2FC2E38F3DD}"/>
+              </a:ext>
+            </a:extLst>
+          </p:cNvPr>
+          <p:cNvSpPr>
+            <a:spLocks noGrp="1"/>
+          </p:cNvSpPr>
+          <p:nvPr>
+            <p:ph idx="1"/>
+          </p:nvPr>
+        </p:nvSpPr>
+        <p:spPr/>
+        <p:txBody>
+          <a:bodyPr/>
+          <a:lstStyle/>
+          <a:p>
+            <a:r>
+              <a:rPr lang="pt-BR" dirty="0"/>
+              <a:t>Para solução do problema, foi implementado dois algoritmos:</a:t>
+            </a:r>
+          </a:p>
+          <a:p>
+            <a:r>
+              <a:rPr lang="pt-BR" dirty="0" err="1"/>
+              <a:t>Dijkstra's</a:t>
+            </a:r>
+            <a:r>
+              <a:rPr lang="pt-BR" dirty="0"/>
+              <a:t> adaptado para contabilizar latência</a:t>
+            </a:r>
+          </a:p>
+          <a:p>
+            <a:endParaRPr lang="pt-BR" dirty="0"/>
+          </a:p>
+          <a:p>
+            <a:r>
+              <a:rPr lang="pt-BR" dirty="0"/>
+              <a:t>Algoritmo Genético com PMX crossover e mutação de troca</a:t>
+            </a:r>
+          </a:p>
+          <a:p>
+            <a:endParaRPr lang="pt-BR" dirty="0"/>
+          </a:p>
+        </p:txBody>
+      </p:sp>
+    </p:spTree>
+    <p:extLst>
+      <p:ext uri="{BB962C8B-B14F-4D97-AF65-F5344CB8AC3E}">
+        <p14:creationId xmlns:p14="http://schemas.microsoft.com/office/powerpoint/2010/main" val="479512562"/>
+      </p:ext>
+    </p:extLst>
+  </p:cSld>
+  <p:clrMapOvr>
+    <a:masterClrMapping/>
+  </p:clrMapOvr>
+</p:sld>
+</file>
+
+<file path=ppt/slides/slide3.xml><?xml version="1.0" encoding="utf-8"?>
+<p:sld xmlns:a="http://schemas.openxmlformats.org/drawingml/2006/main" xmlns:r="http://schemas.openxmlformats.org/officeDocument/2006/relationships" xmlns:p="http://schemas.openxmlformats.org/presentationml/2006/main">
+  <p:cSld>
+    <p:spTree>
+      <p:nvGrpSpPr>
+        <p:cNvPr id="1" name=""/>
+        <p:cNvGrpSpPr/>
+        <p:nvPr/>
+      </p:nvGrpSpPr>
+      <p:grpSpPr>
+        <a:xfrm>
+          <a:off x="0" y="0"/>
+          <a:ext cx="0" cy="0"/>
+          <a:chOff x="0" y="0"/>
+          <a:chExt cx="0" cy="0"/>
+        </a:xfrm>
+      </p:grpSpPr>
+      <p:sp>
+        <p:nvSpPr>
+          <p:cNvPr id="2" name="Title 1">
+            <a:extLst>
+              <a:ext uri="{FF2B5EF4-FFF2-40B4-BE49-F238E27FC236}">
+                <a16:creationId xmlns:a16="http://schemas.microsoft.com/office/drawing/2014/main" id="{0A8C2E8E-FFB9-4AEF-9667-CD351BDD0524}"/>
+              </a:ext>
+            </a:extLst>
+          </p:cNvPr>
+          <p:cNvSpPr>
+            <a:spLocks noGrp="1"/>
+          </p:cNvSpPr>
+          <p:nvPr>
+            <p:ph type="title"/>
+          </p:nvPr>
+        </p:nvSpPr>
+        <p:spPr/>
+        <p:txBody>
+          <a:bodyPr/>
+          <a:lstStyle/>
+          <a:p>
+            <a:r>
+              <a:rPr lang="pt-BR" dirty="0" err="1"/>
+              <a:t>Dijkstra's</a:t>
+            </a:r>
+            <a:r>
+              <a:rPr lang="pt-BR" dirty="0"/>
+              <a:t> contabilizando latência</a:t>
+            </a:r>
+          </a:p>
+        </p:txBody>
+      </p:sp>
+      <p:sp>
+        <p:nvSpPr>
+          <p:cNvPr id="3" name="Content Placeholder 2">
+            <a:extLst>
+              <a:ext uri="{FF2B5EF4-FFF2-40B4-BE49-F238E27FC236}">
+                <a16:creationId xmlns:a16="http://schemas.microsoft.com/office/drawing/2014/main" id="{EF8F2F8C-DB83-407A-9677-D6D87BD97D17}"/>
+              </a:ext>
+            </a:extLst>
+          </p:cNvPr>
+          <p:cNvSpPr>
+            <a:spLocks noGrp="1"/>
+          </p:cNvSpPr>
+          <p:nvPr>
+            <p:ph idx="1"/>
+          </p:nvPr>
+        </p:nvSpPr>
+        <p:spPr/>
+        <p:txBody>
+          <a:bodyPr/>
+          <a:lstStyle/>
+          <a:p>
+            <a:r>
+              <a:rPr lang="pt-BR" dirty="0"/>
+              <a:t>Foi implementado um algoritmo guloso que é uma implementação do algoritmo </a:t>
+            </a:r>
+            <a:r>
+              <a:rPr lang="pt-BR" dirty="0" err="1"/>
+              <a:t>Dijkstra's</a:t>
+            </a:r>
+            <a:r>
+              <a:rPr lang="pt-BR" dirty="0"/>
+              <a:t> com a adaptação de guardar a latência de cada nó visitado, durante sua visita.</a:t>
+            </a:r>
+          </a:p>
+          <a:p>
+            <a:r>
+              <a:rPr lang="pt-BR" dirty="0"/>
+              <a:t>Pela natureza do algoritmo guloso, o percurso guloso foi sempre o mesmo devido a previsibilidade de andar sempre para o nó mais próximo.</a:t>
+            </a:r>
+          </a:p>
+          <a:p>
+            <a:endParaRPr lang="pt-BR" dirty="0"/>
+          </a:p>
+          <a:p>
+            <a:endParaRPr lang="pt-BR" dirty="0"/>
+          </a:p>
+        </p:txBody>
+      </p:sp>
+    </p:spTree>
+    <p:extLst>
+      <p:ext uri="{BB962C8B-B14F-4D97-AF65-F5344CB8AC3E}">
+        <p14:creationId xmlns:p14="http://schemas.microsoft.com/office/powerpoint/2010/main" val="1759375873"/>
+      </p:ext>
+    </p:extLst>
+  </p:cSld>
+  <p:clrMapOvr>
+    <a:masterClrMapping/>
+  </p:clrMapOvr>
+</p:sld>
+</file>
+
+<file path=ppt/slides/slide4.xml><?xml version="1.0" encoding="utf-8"?>
+<p:sld xmlns:a="http://schemas.openxmlformats.org/drawingml/2006/main" xmlns:r="http://schemas.openxmlformats.org/officeDocument/2006/relationships" xmlns:p="http://schemas.openxmlformats.org/presentationml/2006/main">
+  <p:cSld>
+    <p:spTree>
+      <p:nvGrpSpPr>
+        <p:cNvPr id="1" name=""/>
+        <p:cNvGrpSpPr/>
+        <p:nvPr/>
+      </p:nvGrpSpPr>
+      <p:grpSpPr>
+        <a:xfrm>
+          <a:off x="0" y="0"/>
+          <a:ext cx="0" cy="0"/>
+          <a:chOff x="0" y="0"/>
+          <a:chExt cx="0" cy="0"/>
+        </a:xfrm>
+      </p:grpSpPr>
+      <p:sp>
+        <p:nvSpPr>
+          <p:cNvPr id="2" name="Title 1">
+            <a:extLst>
+              <a:ext uri="{FF2B5EF4-FFF2-40B4-BE49-F238E27FC236}">
+                <a16:creationId xmlns:a16="http://schemas.microsoft.com/office/drawing/2014/main" id="{0A8C2E8E-FFB9-4AEF-9667-CD351BDD0524}"/>
+              </a:ext>
+            </a:extLst>
+          </p:cNvPr>
+          <p:cNvSpPr>
+            <a:spLocks noGrp="1"/>
+          </p:cNvSpPr>
+          <p:nvPr>
+            <p:ph type="title"/>
+          </p:nvPr>
+        </p:nvSpPr>
+        <p:spPr/>
+        <p:txBody>
+          <a:bodyPr/>
+          <a:lstStyle/>
+          <a:p>
+            <a:r>
+              <a:rPr lang="pt-BR" dirty="0" err="1"/>
+              <a:t>Dijkstra’s</a:t>
+            </a:r>
+            <a:r>
+              <a:rPr lang="pt-BR" dirty="0"/>
+              <a:t> contabilizando latência</a:t>
+            </a:r>
+          </a:p>
+        </p:txBody>
+      </p:sp>
+      <p:sp>
+        <p:nvSpPr>
+          <p:cNvPr id="3" name="Content Placeholder 2">
+            <a:extLst>
+              <a:ext uri="{FF2B5EF4-FFF2-40B4-BE49-F238E27FC236}">
+                <a16:creationId xmlns:a16="http://schemas.microsoft.com/office/drawing/2014/main" id="{EF8F2F8C-DB83-407A-9677-D6D87BD97D17}"/>
+              </a:ext>
+            </a:extLst>
+          </p:cNvPr>
+          <p:cNvSpPr>
+            <a:spLocks noGrp="1"/>
+          </p:cNvSpPr>
+          <p:nvPr>
+            <p:ph idx="1"/>
+          </p:nvPr>
+        </p:nvSpPr>
+        <p:spPr/>
+        <p:txBody>
+          <a:bodyPr/>
+          <a:lstStyle/>
+          <a:p>
+            <a:endParaRPr lang="pt-BR" dirty="0"/>
+          </a:p>
+          <a:p>
+            <a:endParaRPr lang="pt-BR" dirty="0"/>
+          </a:p>
+        </p:txBody>
+      </p:sp>
+      <p:pic>
+        <p:nvPicPr>
+          <p:cNvPr id="4" name="Picture 3">
+            <a:extLst>
+              <a:ext uri="{FF2B5EF4-FFF2-40B4-BE49-F238E27FC236}">
+                <a16:creationId xmlns:a16="http://schemas.microsoft.com/office/drawing/2014/main" id="{9914F444-BBBE-4165-86DB-AC0A135998F7}"/>
+              </a:ext>
+            </a:extLst>
+          </p:cNvPr>
+          <p:cNvPicPr>
+            <a:picLocks noChangeAspect="1"/>
+          </p:cNvPicPr>
+          <p:nvPr/>
+        </p:nvPicPr>
+        <p:blipFill>
+          <a:blip r:embed="rId2"/>
+          <a:stretch>
+            <a:fillRect/>
+          </a:stretch>
+        </p:blipFill>
+        <p:spPr>
+          <a:xfrm>
+            <a:off x="2371725" y="1411436"/>
+            <a:ext cx="5621655" cy="4765527"/>
+          </a:xfrm>
+          <a:prstGeom prst="rect">
+            <a:avLst/>
+          </a:prstGeom>
+        </p:spPr>
+      </p:pic>
+    </p:spTree>
+    <p:extLst>
+      <p:ext uri="{BB962C8B-B14F-4D97-AF65-F5344CB8AC3E}">
+        <p14:creationId xmlns:p14="http://schemas.microsoft.com/office/powerpoint/2010/main" val="1940600110"/>
+      </p:ext>
+    </p:extLst>
+  </p:cSld>
+  <p:clrMapOvr>
+    <a:masterClrMapping/>
+  </p:clrMapOvr>
+</p:sld>
+</file>
+
+<file path=ppt/slides/slide5.xml><?xml version="1.0" encoding="utf-8"?>
+<p:sld xmlns:a="http://schemas.openxmlformats.org/drawingml/2006/main" xmlns:r="http://schemas.openxmlformats.org/officeDocument/2006/relationships" xmlns:p="http://schemas.openxmlformats.org/presentationml/2006/main">
+  <p:cSld>
+    <p:spTree>
+      <p:nvGrpSpPr>
+        <p:cNvPr id="1" name=""/>
+        <p:cNvGrpSpPr/>
+        <p:nvPr/>
+      </p:nvGrpSpPr>
+      <p:grpSpPr>
+        <a:xfrm>
+          <a:off x="0" y="0"/>
+          <a:ext cx="0" cy="0"/>
+          <a:chOff x="0" y="0"/>
+          <a:chExt cx="0" cy="0"/>
+        </a:xfrm>
+      </p:grpSpPr>
+      <p:sp>
+        <p:nvSpPr>
+          <p:cNvPr id="2" name="Title 1">
+            <a:extLst>
+              <a:ext uri="{FF2B5EF4-FFF2-40B4-BE49-F238E27FC236}">
+                <a16:creationId xmlns:a16="http://schemas.microsoft.com/office/drawing/2014/main" id="{0A8C2E8E-FFB9-4AEF-9667-CD351BDD0524}"/>
+              </a:ext>
+            </a:extLst>
+          </p:cNvPr>
+          <p:cNvSpPr>
+            <a:spLocks noGrp="1"/>
+          </p:cNvSpPr>
+          <p:nvPr>
+            <p:ph type="title"/>
+          </p:nvPr>
+        </p:nvSpPr>
+        <p:spPr/>
+        <p:txBody>
+          <a:bodyPr/>
+          <a:lstStyle/>
+          <a:p>
+            <a:r>
+              <a:rPr lang="pt-BR" dirty="0"/>
+              <a:t>Algoritmo Genético com PMX crossover e mutação de troca</a:t>
+            </a:r>
+          </a:p>
+        </p:txBody>
+      </p:sp>
+      <p:sp>
+        <p:nvSpPr>
+          <p:cNvPr id="3" name="Content Placeholder 2">
+            <a:extLst>
+              <a:ext uri="{FF2B5EF4-FFF2-40B4-BE49-F238E27FC236}">
+                <a16:creationId xmlns:a16="http://schemas.microsoft.com/office/drawing/2014/main" id="{EF8F2F8C-DB83-407A-9677-D6D87BD97D17}"/>
+              </a:ext>
+            </a:extLst>
+          </p:cNvPr>
+          <p:cNvSpPr>
+            <a:spLocks noGrp="1"/>
+          </p:cNvSpPr>
+          <p:nvPr>
+            <p:ph idx="1"/>
+          </p:nvPr>
+        </p:nvSpPr>
+        <p:spPr>
+          <a:xfrm>
+            <a:off x="838200" y="1825624"/>
+            <a:ext cx="6145530" cy="4667251"/>
+          </a:xfrm>
+        </p:spPr>
+        <p:txBody>
+          <a:bodyPr/>
+          <a:lstStyle/>
+          <a:p>
+            <a:r>
+              <a:rPr lang="pt-BR" dirty="0" err="1"/>
+              <a:t>Metaheurística</a:t>
+            </a:r>
+            <a:r>
+              <a:rPr lang="pt-BR" dirty="0"/>
+              <a:t> selecionada foi um algoritmo genético.</a:t>
+            </a:r>
+          </a:p>
+          <a:p>
+            <a:r>
+              <a:rPr lang="pt-BR" dirty="0"/>
+              <a:t>Crossover Mapeado Parcialmente (PMX) . Foi usado um vetor de reposicionamento para lidar com as colisões dos genes fora do segmento cortado durante o PMX.</a:t>
+            </a:r>
+          </a:p>
+          <a:p>
+            <a:endParaRPr lang="pt-BR" dirty="0"/>
+          </a:p>
+          <a:p>
+            <a:endParaRPr lang="pt-BR" dirty="0"/>
+          </a:p>
+        </p:txBody>
+      </p:sp>
+      <p:pic>
+        <p:nvPicPr>
+          <p:cNvPr id="5" name="Picture 4">
+            <a:extLst>
+              <a:ext uri="{FF2B5EF4-FFF2-40B4-BE49-F238E27FC236}">
+                <a16:creationId xmlns:a16="http://schemas.microsoft.com/office/drawing/2014/main" id="{C3A224A8-E583-47C5-8958-261F092D271E}"/>
+              </a:ext>
+            </a:extLst>
+          </p:cNvPr>
+          <p:cNvPicPr>
+            <a:picLocks noChangeAspect="1"/>
+          </p:cNvPicPr>
+          <p:nvPr/>
+        </p:nvPicPr>
+        <p:blipFill>
+          <a:blip r:embed="rId2"/>
+          <a:stretch>
+            <a:fillRect/>
+          </a:stretch>
+        </p:blipFill>
+        <p:spPr>
+          <a:xfrm>
+            <a:off x="6983730" y="1690688"/>
+            <a:ext cx="4686300" cy="4591050"/>
+          </a:xfrm>
+          <a:prstGeom prst="rect">
+            <a:avLst/>
+          </a:prstGeom>
+        </p:spPr>
+      </p:pic>
+    </p:spTree>
+    <p:extLst>
+      <p:ext uri="{BB962C8B-B14F-4D97-AF65-F5344CB8AC3E}">
+        <p14:creationId xmlns:p14="http://schemas.microsoft.com/office/powerpoint/2010/main" val="4136231959"/>
+      </p:ext>
+    </p:extLst>
+  </p:cSld>
+  <p:clrMapOvr>
+    <a:masterClrMapping/>
+  </p:clrMapOvr>
+</p:sld>
+</file>
+
+<file path=ppt/slides/slide6.xml><?xml version="1.0" encoding="utf-8"?>
+<p:sld xmlns:a="http://schemas.openxmlformats.org/drawingml/2006/main" xmlns:r="http://schemas.openxmlformats.org/officeDocument/2006/relationships" xmlns:p="http://schemas.openxmlformats.org/presentationml/2006/main">
+  <p:cSld>
+    <p:spTree>
+      <p:nvGrpSpPr>
+        <p:cNvPr id="1" name=""/>
+        <p:cNvGrpSpPr/>
+        <p:nvPr/>
+      </p:nvGrpSpPr>
+      <p:grpSpPr>
+        <a:xfrm>
+          <a:off x="0" y="0"/>
+          <a:ext cx="0" cy="0"/>
+          <a:chOff x="0" y="0"/>
+          <a:chExt cx="0" cy="0"/>
+        </a:xfrm>
+      </p:grpSpPr>
+      <p:sp>
+        <p:nvSpPr>
+          <p:cNvPr id="2" name="Title 1">
+            <a:extLst>
+              <a:ext uri="{FF2B5EF4-FFF2-40B4-BE49-F238E27FC236}">
+                <a16:creationId xmlns:a16="http://schemas.microsoft.com/office/drawing/2014/main" id="{0A8C2E8E-FFB9-4AEF-9667-CD351BDD0524}"/>
+              </a:ext>
+            </a:extLst>
+          </p:cNvPr>
+          <p:cNvSpPr>
+            <a:spLocks noGrp="1"/>
+          </p:cNvSpPr>
+          <p:nvPr>
+            <p:ph type="title"/>
+          </p:nvPr>
+        </p:nvSpPr>
+        <p:spPr/>
+        <p:txBody>
+          <a:bodyPr/>
+          <a:lstStyle/>
+          <a:p>
+            <a:r>
+              <a:rPr lang="pt-BR" dirty="0"/>
+              <a:t>Geração de indivíduos</a:t>
+            </a:r>
+          </a:p>
+        </p:txBody>
+      </p:sp>
+      <p:sp>
+        <p:nvSpPr>
+          <p:cNvPr id="3" name="Content Placeholder 2">
+            <a:extLst>
+              <a:ext uri="{FF2B5EF4-FFF2-40B4-BE49-F238E27FC236}">
+                <a16:creationId xmlns:a16="http://schemas.microsoft.com/office/drawing/2014/main" id="{EF8F2F8C-DB83-407A-9677-D6D87BD97D17}"/>
+              </a:ext>
+            </a:extLst>
+          </p:cNvPr>
+          <p:cNvSpPr>
+            <a:spLocks noGrp="1"/>
+          </p:cNvSpPr>
+          <p:nvPr>
+            <p:ph idx="1"/>
+          </p:nvPr>
+        </p:nvSpPr>
+        <p:spPr>
+          <a:xfrm>
+            <a:off x="838200" y="1825624"/>
+            <a:ext cx="6145530" cy="4667251"/>
+          </a:xfrm>
+        </p:spPr>
+        <p:txBody>
+          <a:bodyPr/>
+          <a:lstStyle/>
+          <a:p>
+            <a:r>
+              <a:rPr lang="pt-BR" dirty="0"/>
+              <a:t> A primeira geração contem caminhos aleatórios acrescentado, porem foi acrescentado o caminho da solução gulosa, visto que sabemos que ela é comparativamente melhor que os primeiros indivíduos aleatórios, para que comecemos com pelo menos um pai bom.</a:t>
+            </a:r>
+          </a:p>
+          <a:p>
+            <a:endParaRPr lang="pt-BR" dirty="0"/>
+          </a:p>
+          <a:p>
+            <a:endParaRPr lang="pt-BR" dirty="0"/>
+          </a:p>
+        </p:txBody>
+      </p:sp>
+      <p:pic>
+        <p:nvPicPr>
+          <p:cNvPr id="6" name="Picture 5">
+            <a:extLst>
+              <a:ext uri="{FF2B5EF4-FFF2-40B4-BE49-F238E27FC236}">
+                <a16:creationId xmlns:a16="http://schemas.microsoft.com/office/drawing/2014/main" id="{E3D61BD8-D0C7-415C-930D-132D9B60DB03}"/>
+              </a:ext>
+            </a:extLst>
+          </p:cNvPr>
+          <p:cNvPicPr>
+            <a:picLocks noChangeAspect="1"/>
+          </p:cNvPicPr>
+          <p:nvPr/>
+        </p:nvPicPr>
+        <p:blipFill>
+          <a:blip r:embed="rId2"/>
+          <a:stretch>
+            <a:fillRect/>
+          </a:stretch>
+        </p:blipFill>
+        <p:spPr>
+          <a:xfrm>
+            <a:off x="6983730" y="1774306"/>
+            <a:ext cx="4699046" cy="2553997"/>
+          </a:xfrm>
+          <a:prstGeom prst="rect">
+            <a:avLst/>
+          </a:prstGeom>
+        </p:spPr>
+      </p:pic>
+    </p:spTree>
+    <p:extLst>
+      <p:ext uri="{BB962C8B-B14F-4D97-AF65-F5344CB8AC3E}">
+        <p14:creationId xmlns:p14="http://schemas.microsoft.com/office/powerpoint/2010/main" val="1145190765"/>
+      </p:ext>
+    </p:extLst>
+  </p:cSld>
+  <p:clrMapOvr>
+    <a:masterClrMapping/>
+  </p:clrMapOvr>
+</p:sld>
+</file>
+
+<file path=ppt/slides/slide7.xml><?xml version="1.0" encoding="utf-8"?>
+<p:sld xmlns:a="http://schemas.openxmlformats.org/drawingml/2006/main" xmlns:r="http://schemas.openxmlformats.org/officeDocument/2006/relationships" xmlns:p="http://schemas.openxmlformats.org/presentationml/2006/main">
+  <p:cSld>
+    <p:spTree>
+      <p:nvGrpSpPr>
+        <p:cNvPr id="1" name=""/>
+        <p:cNvGrpSpPr/>
+        <p:nvPr/>
+      </p:nvGrpSpPr>
+      <p:grpSpPr>
+        <a:xfrm>
+          <a:off x="0" y="0"/>
+          <a:ext cx="0" cy="0"/>
+          <a:chOff x="0" y="0"/>
+          <a:chExt cx="0" cy="0"/>
+        </a:xfrm>
+      </p:grpSpPr>
+      <p:sp>
+        <p:nvSpPr>
+          <p:cNvPr id="2" name="Title 1">
+            <a:extLst>
+              <a:ext uri="{FF2B5EF4-FFF2-40B4-BE49-F238E27FC236}">
+                <a16:creationId xmlns:a16="http://schemas.microsoft.com/office/drawing/2014/main" id="{0A8C2E8E-FFB9-4AEF-9667-CD351BDD0524}"/>
+              </a:ext>
+            </a:extLst>
+          </p:cNvPr>
+          <p:cNvSpPr>
+            <a:spLocks noGrp="1"/>
+          </p:cNvSpPr>
+          <p:nvPr>
+            <p:ph type="title"/>
+          </p:nvPr>
+        </p:nvSpPr>
+        <p:spPr/>
+        <p:txBody>
+          <a:bodyPr/>
+          <a:lstStyle/>
+          <a:p>
+            <a:r>
+              <a:rPr lang="pt-BR" dirty="0"/>
+              <a:t>Função heurística</a:t>
+            </a:r>
+          </a:p>
+        </p:txBody>
+      </p:sp>
+      <p:sp>
+        <p:nvSpPr>
+          <p:cNvPr id="3" name="Content Placeholder 2">
+            <a:extLst>
+              <a:ext uri="{FF2B5EF4-FFF2-40B4-BE49-F238E27FC236}">
+                <a16:creationId xmlns:a16="http://schemas.microsoft.com/office/drawing/2014/main" id="{EF8F2F8C-DB83-407A-9677-D6D87BD97D17}"/>
+              </a:ext>
+            </a:extLst>
+          </p:cNvPr>
+          <p:cNvSpPr>
+            <a:spLocks noGrp="1"/>
+          </p:cNvSpPr>
+          <p:nvPr>
+            <p:ph idx="1"/>
+          </p:nvPr>
+        </p:nvSpPr>
+        <p:spPr>
+          <a:xfrm>
+            <a:off x="698240" y="3159903"/>
+            <a:ext cx="11235613" cy="3110268"/>
+          </a:xfrm>
+        </p:spPr>
+        <p:txBody>
+          <a:bodyPr>
+            <a:normAutofit/>
+          </a:bodyPr>
+          <a:lstStyle/>
+          <a:p>
+            <a:r>
+              <a:rPr lang="pt-BR" dirty="0"/>
+              <a:t>A função heurística considerada foi a própria latência total do caminho, e usamos o paradigma de que não sabíamos o ótimo/melhor latência alcançável (OPT/BKS), pois normalmente em problemas reais não saberíamos e por isso não usamos esse OPT/BKS na função heurística.</a:t>
+            </a:r>
+          </a:p>
+          <a:p>
+            <a:pPr marL="0" indent="0">
+              <a:buNone/>
+            </a:pPr>
+            <a:endParaRPr lang="pt-BR" dirty="0"/>
+          </a:p>
+          <a:p>
+            <a:endParaRPr lang="pt-BR" dirty="0"/>
+          </a:p>
+        </p:txBody>
+      </p:sp>
+      <p:pic>
+        <p:nvPicPr>
+          <p:cNvPr id="5" name="Picture 4">
+            <a:extLst>
+              <a:ext uri="{FF2B5EF4-FFF2-40B4-BE49-F238E27FC236}">
+                <a16:creationId xmlns:a16="http://schemas.microsoft.com/office/drawing/2014/main" id="{BD78751A-5E15-4FBC-B3F8-F8FBD006FABD}"/>
+              </a:ext>
+            </a:extLst>
+          </p:cNvPr>
+          <p:cNvPicPr>
+            <a:picLocks noChangeAspect="1"/>
+          </p:cNvPicPr>
+          <p:nvPr/>
+        </p:nvPicPr>
+        <p:blipFill>
+          <a:blip r:embed="rId2"/>
+          <a:stretch>
+            <a:fillRect/>
+          </a:stretch>
+        </p:blipFill>
+        <p:spPr>
+          <a:xfrm>
+            <a:off x="1144814" y="1540653"/>
+            <a:ext cx="8858250" cy="1619250"/>
+          </a:xfrm>
+          <a:prstGeom prst="rect">
+            <a:avLst/>
+          </a:prstGeom>
+        </p:spPr>
+      </p:pic>
+    </p:spTree>
+    <p:extLst>
+      <p:ext uri="{BB962C8B-B14F-4D97-AF65-F5344CB8AC3E}">
+        <p14:creationId xmlns:p14="http://schemas.microsoft.com/office/powerpoint/2010/main" val="4214817213"/>
+      </p:ext>
+    </p:extLst>
+  </p:cSld>
+  <p:clrMapOvr>
+    <a:masterClrMapping/>
+  </p:clrMapOvr>
+</p:sld>
+</file>
+
+<file path=ppt/slides/slide8.xml><?xml version="1.0" encoding="utf-8"?>
+<p:sld xmlns:a="http://schemas.openxmlformats.org/drawingml/2006/main" xmlns:r="http://schemas.openxmlformats.org/officeDocument/2006/relationships" xmlns:p="http://schemas.openxmlformats.org/presentationml/2006/main">
+  <p:cSld>
+    <p:spTree>
+      <p:nvGrpSpPr>
+        <p:cNvPr id="1" name=""/>
+        <p:cNvGrpSpPr/>
+        <p:nvPr/>
+      </p:nvGrpSpPr>
+      <p:grpSpPr>
+        <a:xfrm>
+          <a:off x="0" y="0"/>
+          <a:ext cx="0" cy="0"/>
+          <a:chOff x="0" y="0"/>
+          <a:chExt cx="0" cy="0"/>
+        </a:xfrm>
+      </p:grpSpPr>
+      <p:sp>
+        <p:nvSpPr>
+          <p:cNvPr id="2" name="Title 1">
+            <a:extLst>
+              <a:ext uri="{FF2B5EF4-FFF2-40B4-BE49-F238E27FC236}">
+                <a16:creationId xmlns:a16="http://schemas.microsoft.com/office/drawing/2014/main" id="{FF5A4DB1-33AE-4011-B0E9-463D3BCC4B6C}"/>
+              </a:ext>
+            </a:extLst>
+          </p:cNvPr>
+          <p:cNvSpPr>
+            <a:spLocks noGrp="1"/>
+          </p:cNvSpPr>
+          <p:nvPr>
+            <p:ph type="title"/>
+          </p:nvPr>
+        </p:nvSpPr>
+        <p:spPr>
+          <a:xfrm>
+            <a:off x="838200" y="365125"/>
+            <a:ext cx="2212910" cy="1325563"/>
+          </a:xfrm>
+        </p:spPr>
+        <p:txBody>
+          <a:bodyPr/>
+          <a:lstStyle/>
+          <a:p>
+            <a:r>
+              <a:rPr lang="en-US" dirty="0" err="1"/>
+              <a:t>Sele</a:t>
+            </a:r>
+            <a:r>
+              <a:rPr lang="pt-BR" dirty="0"/>
+              <a:t>ç</a:t>
+            </a:r>
+            <a:r>
+              <a:rPr lang="en-US" dirty="0" err="1"/>
+              <a:t>ão</a:t>
+            </a:r>
+            <a:r>
+              <a:rPr lang="en-US" dirty="0"/>
+              <a:t> dos </a:t>
+            </a:r>
+            <a:r>
+              <a:rPr lang="en-US" dirty="0" err="1"/>
+              <a:t>pais</a:t>
+            </a:r>
+            <a:endParaRPr lang="pt-BR" dirty="0"/>
+          </a:p>
+        </p:txBody>
+      </p:sp>
+      <p:sp>
+        <p:nvSpPr>
+          <p:cNvPr id="3" name="Content Placeholder 2">
+            <a:extLst>
+              <a:ext uri="{FF2B5EF4-FFF2-40B4-BE49-F238E27FC236}">
+                <a16:creationId xmlns:a16="http://schemas.microsoft.com/office/drawing/2014/main" id="{C6F617BA-4FF5-44F9-993D-4CD585C84695}"/>
+              </a:ext>
+            </a:extLst>
+          </p:cNvPr>
+          <p:cNvSpPr>
+            <a:spLocks noGrp="1"/>
+          </p:cNvSpPr>
+          <p:nvPr>
+            <p:ph idx="1"/>
+          </p:nvPr>
+        </p:nvSpPr>
+        <p:spPr>
+          <a:xfrm>
+            <a:off x="627483" y="2947988"/>
+            <a:ext cx="10937033" cy="3810065"/>
+          </a:xfrm>
+        </p:spPr>
+        <p:txBody>
+          <a:bodyPr>
+            <a:normAutofit/>
+          </a:bodyPr>
+          <a:lstStyle/>
+          <a:p>
+            <a:r>
+              <a:rPr lang="pt-BR" dirty="0"/>
+              <a:t>A seleção dos pais que iriam procriar foi implementada ordenando os melhores pais, e sempre pegando os X melhores pais, porem como foi aprendido em aula que é bom ter pais não necessariamente bons, foi adicionado a listagem de pais Y filhos com índice que não estavam entre esses melhores pais, assim adicionando sempre um numero fixo de filhos não ótimos e assim mantendo a variabilidade nos indivíduos em cada geração de maneira bem simples.</a:t>
+            </a:r>
+          </a:p>
+          <a:p>
+            <a:endParaRPr lang="pt-BR" dirty="0"/>
+          </a:p>
+        </p:txBody>
+      </p:sp>
+      <p:pic>
+        <p:nvPicPr>
+          <p:cNvPr id="5" name="Picture 4">
+            <a:extLst>
+              <a:ext uri="{FF2B5EF4-FFF2-40B4-BE49-F238E27FC236}">
+                <a16:creationId xmlns:a16="http://schemas.microsoft.com/office/drawing/2014/main" id="{7C1A3641-EA3D-4680-BFEE-E6548520B858}"/>
+              </a:ext>
+            </a:extLst>
+          </p:cNvPr>
+          <p:cNvPicPr>
+            <a:picLocks noChangeAspect="1"/>
+          </p:cNvPicPr>
+          <p:nvPr/>
+        </p:nvPicPr>
+        <p:blipFill>
+          <a:blip r:embed="rId2"/>
+          <a:stretch>
+            <a:fillRect/>
+          </a:stretch>
+        </p:blipFill>
+        <p:spPr>
+          <a:xfrm>
+            <a:off x="3517709" y="433388"/>
+            <a:ext cx="8239125" cy="2514600"/>
+          </a:xfrm>
+          <a:prstGeom prst="rect">
+            <a:avLst/>
+          </a:prstGeom>
+        </p:spPr>
+      </p:pic>
+    </p:spTree>
+    <p:extLst>
+      <p:ext uri="{BB962C8B-B14F-4D97-AF65-F5344CB8AC3E}">
+        <p14:creationId xmlns:p14="http://schemas.microsoft.com/office/powerpoint/2010/main" val="3170235124"/>
+      </p:ext>
+    </p:extLst>
+  </p:cSld>
+  <p:clrMapOvr>
+    <a:masterClrMapping/>
+  </p:clrMapOvr>
+</p:sld>
+</file>
+
+<file path=ppt/slides/slide9.xml><?xml version="1.0" encoding="utf-8"?>
+<p:sld xmlns:a="http://schemas.openxmlformats.org/drawingml/2006/main" xmlns:r="http://schemas.openxmlformats.org/officeDocument/2006/relationships" xmlns:p="http://schemas.openxmlformats.org/presentationml/2006/main">
+  <p:cSld>
+    <p:spTree>
+      <p:nvGrpSpPr>
+        <p:cNvPr id="1" name=""/>
+        <p:cNvGrpSpPr/>
+        <p:nvPr/>
+      </p:nvGrpSpPr>
+      <p:grpSpPr>
+        <a:xfrm>
+          <a:off x="0" y="0"/>
+          <a:ext cx="0" cy="0"/>
+          <a:chOff x="0" y="0"/>
+          <a:chExt cx="0" cy="0"/>
+        </a:xfrm>
+      </p:grpSpPr>
+      <p:sp>
+        <p:nvSpPr>
+          <p:cNvPr id="2" name="Title 1">
+            <a:extLst>
+              <a:ext uri="{FF2B5EF4-FFF2-40B4-BE49-F238E27FC236}">
+                <a16:creationId xmlns:a16="http://schemas.microsoft.com/office/drawing/2014/main" id="{FF5A4DB1-33AE-4011-B0E9-463D3BCC4B6C}"/>
+              </a:ext>
+            </a:extLst>
+          </p:cNvPr>
+          <p:cNvSpPr>
+            <a:spLocks noGrp="1"/>
+          </p:cNvSpPr>
+          <p:nvPr>
+            <p:ph type="title"/>
+          </p:nvPr>
+        </p:nvSpPr>
+        <p:spPr>
+          <a:xfrm>
+            <a:off x="838199" y="365126"/>
+            <a:ext cx="10515599" cy="833360"/>
+          </a:xfrm>
+        </p:spPr>
+        <p:txBody>
+          <a:bodyPr/>
+          <a:lstStyle/>
+          <a:p>
+            <a:r>
+              <a:rPr lang="en-US" dirty="0" err="1"/>
+              <a:t>Mutação</a:t>
+            </a:r>
+            <a:endParaRPr lang="pt-BR" dirty="0"/>
+          </a:p>
+        </p:txBody>
+      </p:sp>
+      <p:sp>
+        <p:nvSpPr>
+          <p:cNvPr id="6" name="Content Placeholder 5">
+            <a:extLst>
+              <a:ext uri="{FF2B5EF4-FFF2-40B4-BE49-F238E27FC236}">
+                <a16:creationId xmlns:a16="http://schemas.microsoft.com/office/drawing/2014/main" id="{00DAFA02-4916-4E3F-B49A-A78D684A57DD}"/>
+              </a:ext>
+            </a:extLst>
+          </p:cNvPr>
+          <p:cNvSpPr>
+            <a:spLocks noGrp="1"/>
+          </p:cNvSpPr>
+          <p:nvPr>
+            <p:ph idx="1"/>
+          </p:nvPr>
+        </p:nvSpPr>
+        <p:spPr>
+          <a:xfrm>
+            <a:off x="838200" y="1198486"/>
+            <a:ext cx="10515600" cy="4978477"/>
+          </a:xfrm>
+        </p:spPr>
+        <p:txBody>
+          <a:bodyPr/>
+          <a:lstStyle/>
+          <a:p>
+            <a:r>
+              <a:rPr lang="pt-BR" dirty="0"/>
+              <a:t>Depois da recombinação foi aplicada mutações de com probabilidades variadas dependendo em qual geração estamos, com mais probabilidade nas ultimas gerações. As mutações eram do tipo de troca de genes, com o número de genes trocados variando aleatoriamente também e dependendo do tamanho do caminho.</a:t>
+            </a:r>
+          </a:p>
+          <a:p>
+            <a:endParaRPr lang="pt-BR" dirty="0"/>
+          </a:p>
+        </p:txBody>
+      </p:sp>
+    </p:spTree>
+    <p:extLst>
+      <p:ext uri="{BB962C8B-B14F-4D97-AF65-F5344CB8AC3E}">
+        <p14:creationId xmlns:p14="http://schemas.microsoft.com/office/powerpoint/2010/main" val="1874959623"/>
       </p:ext>
     </p:extLst>
   </p:cSld>

</xml_diff>